<commit_message>
Latest simulation results, changes to poster
</commit_message>
<xml_diff>
--- a/poster/poster-master.pptx
+++ b/poster/poster-master.pptx
@@ -139,7 +139,7 @@
   </p:defaultTextStyle>
   <p:extLst>
     <p:ext uri="{EFAFB233-063F-42B5-8137-9DF3F51BA10A}">
-      <p15:sldGuideLst xmlns:p15="http://schemas.microsoft.com/office/powerpoint/2012/main">
+      <p15:sldGuideLst xmlns:p15="http://schemas.microsoft.com/office/powerpoint/2012/main" xmlns="">
         <p15:guide id="1" orient="horz" pos="9216">
           <p15:clr>
             <a:srgbClr val="A4A3A4"/>
@@ -4967,7 +4967,7 @@
         <p:spPr>
           <a:xfrm>
             <a:off x="24307800" y="4495800"/>
-            <a:ext cx="11734800" cy="1815882"/>
+            <a:ext cx="11734800" cy="2477601"/>
           </a:xfrm>
           <a:prstGeom prst="rect">
             <a:avLst/>
@@ -4985,11 +4985,18 @@
                 <a:latin typeface="Cambria"/>
                 <a:cs typeface="Cambria"/>
               </a:rPr>
-              <a:t>How Did We Do?</a:t>
-            </a:r>
-          </a:p>
-          <a:p>
-            <a:endParaRPr lang="en-US" sz="3200" dirty="0">
+              <a:t>How Did We Do</a:t>
+            </a:r>
+            <a:r>
+              <a:rPr lang="en-US" sz="4400" b="1" u="sng" dirty="0" smtClean="0">
+                <a:latin typeface="Cambria"/>
+                <a:cs typeface="Cambria"/>
+              </a:rPr>
+              <a:t>?</a:t>
+            </a:r>
+          </a:p>
+          <a:p>
+            <a:endParaRPr lang="en-US" sz="1500" dirty="0" smtClean="0">
               <a:latin typeface="Cambria"/>
               <a:cs typeface="Cambria"/>
             </a:endParaRPr>
@@ -5000,21 +5007,39 @@
                 <a:latin typeface="Cambria"/>
                 <a:cs typeface="Cambria"/>
               </a:rPr>
-              <a:t>TODO PERFORMANCE EVALUATION</a:t>
-            </a:r>
-          </a:p>
-        </p:txBody>
-      </p:sp>
-      <p:sp>
-        <p:nvSpPr>
-          <p:cNvPr id="76" name="TextBox 75"/>
+              <a:t>After training our model and testing it against a held-out testing dataset, we correctly predicted </a:t>
+            </a:r>
+            <a:r>
+              <a:rPr lang="en-US" sz="3200" b="1" dirty="0" smtClean="0">
+                <a:latin typeface="Cambria"/>
+                <a:cs typeface="Cambria"/>
+              </a:rPr>
+              <a:t>76%</a:t>
+            </a:r>
+            <a:r>
+              <a:rPr lang="en-US" sz="3200" dirty="0" smtClean="0">
+                <a:latin typeface="Cambria"/>
+                <a:cs typeface="Cambria"/>
+              </a:rPr>
+              <a:t> of regular season games. Our coding process would result in 50% accuracy by random chance.</a:t>
+            </a:r>
+            <a:endParaRPr lang="en-US" sz="3200" dirty="0" smtClean="0">
+              <a:latin typeface="Cambria"/>
+              <a:cs typeface="Cambria"/>
+            </a:endParaRPr>
+          </a:p>
+        </p:txBody>
+      </p:sp>
+      <p:sp>
+        <p:nvSpPr>
+          <p:cNvPr id="79" name="TextBox 78"/>
           <p:cNvSpPr txBox="1"/>
           <p:nvPr/>
         </p:nvSpPr>
         <p:spPr>
           <a:xfrm>
-            <a:off x="24307800" y="12093476"/>
-            <a:ext cx="11734800" cy="2308324"/>
+            <a:off x="24307800" y="21560641"/>
+            <a:ext cx="11734800" cy="1985159"/>
           </a:xfrm>
           <a:prstGeom prst="rect">
             <a:avLst/>
@@ -5032,11 +5057,18 @@
                 <a:latin typeface="Cambria"/>
                 <a:cs typeface="Cambria"/>
               </a:rPr>
-              <a:t>Anyone’s Game</a:t>
-            </a:r>
-          </a:p>
-          <a:p>
-            <a:endParaRPr lang="en-US" sz="3200" dirty="0">
+              <a:t>The Final </a:t>
+            </a:r>
+            <a:r>
+              <a:rPr lang="en-US" sz="4400" b="1" u="sng" dirty="0" smtClean="0">
+                <a:latin typeface="Cambria"/>
+                <a:cs typeface="Cambria"/>
+              </a:rPr>
+              <a:t>Four</a:t>
+            </a:r>
+          </a:p>
+          <a:p>
+            <a:endParaRPr lang="en-US" sz="1500" dirty="0" smtClean="0">
               <a:latin typeface="Cambria"/>
               <a:cs typeface="Cambria"/>
             </a:endParaRPr>
@@ -5047,54 +5079,14 @@
                 <a:latin typeface="Cambria"/>
                 <a:cs typeface="Cambria"/>
               </a:rPr>
-              <a:t>We used our model to simulate the entire 2015 NCAA Tournament 10,000 times. The most likely winners:</a:t>
-            </a:r>
-          </a:p>
-        </p:txBody>
-      </p:sp>
-      <p:sp>
-        <p:nvSpPr>
-          <p:cNvPr id="79" name="TextBox 78"/>
-          <p:cNvSpPr txBox="1"/>
-          <p:nvPr/>
-        </p:nvSpPr>
-        <p:spPr>
-          <a:xfrm>
-            <a:off x="24307800" y="20269200"/>
-            <a:ext cx="11734800" cy="2246769"/>
-          </a:xfrm>
-          <a:prstGeom prst="rect">
-            <a:avLst/>
-          </a:prstGeom>
-          <a:noFill/>
-        </p:spPr>
-        <p:txBody>
-          <a:bodyPr wrap="square" rtlCol="0">
-            <a:spAutoFit/>
-          </a:bodyPr>
-          <a:lstStyle/>
-          <a:p>
-            <a:r>
-              <a:rPr lang="en-US" sz="4400" b="1" u="sng" dirty="0" smtClean="0">
-                <a:latin typeface="Cambria"/>
-                <a:cs typeface="Cambria"/>
-              </a:rPr>
-              <a:t>The Final Four</a:t>
-            </a:r>
-          </a:p>
-          <a:p>
-            <a:endParaRPr lang="en-US" sz="3200" dirty="0">
-              <a:latin typeface="Cambria"/>
-              <a:cs typeface="Cambria"/>
-            </a:endParaRPr>
-          </a:p>
-          <a:p>
+              <a:t>What </a:t>
+            </a:r>
             <a:r>
               <a:rPr lang="en-US" sz="3200" dirty="0" smtClean="0">
                 <a:latin typeface="Cambria"/>
                 <a:cs typeface="Cambria"/>
               </a:rPr>
-              <a:t>What can we say about the actual 2015 Final Four?</a:t>
+              <a:t>can we say about the actual 2015 Final Four?</a:t>
             </a:r>
           </a:p>
           <a:p>
@@ -5659,7 +5651,7 @@
         </p:blipFill>
         <p:spPr>
           <a:xfrm>
-            <a:off x="25100257" y="24368760"/>
+            <a:off x="25100257" y="25359360"/>
             <a:ext cx="1058779" cy="1005840"/>
           </a:xfrm>
           <a:prstGeom prst="rect">
@@ -5689,7 +5681,7 @@
         </p:blipFill>
         <p:spPr>
           <a:xfrm>
-            <a:off x="25091764" y="25435560"/>
+            <a:off x="25091764" y="26426160"/>
             <a:ext cx="1075765" cy="914400"/>
           </a:xfrm>
           <a:prstGeom prst="rect">
@@ -5719,7 +5711,7 @@
         </p:blipFill>
         <p:spPr>
           <a:xfrm>
-            <a:off x="24970293" y="23301960"/>
+            <a:off x="24970293" y="24292560"/>
             <a:ext cx="1318707" cy="914400"/>
           </a:xfrm>
           <a:prstGeom prst="rect">
@@ -5749,7 +5741,7 @@
         </p:blipFill>
         <p:spPr>
           <a:xfrm>
-            <a:off x="25196094" y="26502360"/>
+            <a:off x="25196094" y="27492960"/>
             <a:ext cx="867104" cy="1005840"/>
           </a:xfrm>
           <a:prstGeom prst="rect">
@@ -5766,14 +5758,14 @@
           <p:nvPr>
             <p:extLst>
               <p:ext uri="{D42A27DB-BD31-4B8C-83A1-F6EECF244321}">
-                <p14:modId xmlns:p14="http://schemas.microsoft.com/office/powerpoint/2010/main" val="772334121"/>
+                <p14:modId xmlns:p14="http://schemas.microsoft.com/office/powerpoint/2010/main" val="2947370917"/>
               </p:ext>
             </p:extLst>
           </p:nvPr>
         </p:nvGraphicFramePr>
         <p:xfrm>
-          <a:off x="26289000" y="22692360"/>
-          <a:ext cx="9753600" cy="579120"/>
+          <a:off x="26670000" y="23682960"/>
+          <a:ext cx="8763000" cy="579120"/>
         </p:xfrm>
         <a:graphic>
           <a:graphicData uri="http://schemas.openxmlformats.org/drawingml/2006/table">
@@ -5782,8 +5774,8 @@
                 <a:tableStyleId>{2D5ABB26-0587-4C30-8999-92F81FD0307C}</a:tableStyleId>
               </a:tblPr>
               <a:tblGrid>
-                <a:gridCol w="4876800"/>
-                <a:gridCol w="4876800"/>
+                <a:gridCol w="4381500"/>
+                <a:gridCol w="4381500"/>
               </a:tblGrid>
               <a:tr h="370840">
                 <a:tc>
@@ -5849,14 +5841,14 @@
           <p:nvPr>
             <p:extLst>
               <p:ext uri="{D42A27DB-BD31-4B8C-83A1-F6EECF244321}">
-                <p14:modId xmlns:p14="http://schemas.microsoft.com/office/powerpoint/2010/main" val="2118856129"/>
+                <p14:modId xmlns:p14="http://schemas.microsoft.com/office/powerpoint/2010/main" val="1881362785"/>
               </p:ext>
             </p:extLst>
           </p:nvPr>
         </p:nvGraphicFramePr>
         <p:xfrm>
-          <a:off x="26289000" y="23408640"/>
-          <a:ext cx="9753600" cy="701040"/>
+          <a:off x="26670000" y="24399240"/>
+          <a:ext cx="8763000" cy="701040"/>
         </p:xfrm>
         <a:graphic>
           <a:graphicData uri="http://schemas.openxmlformats.org/drawingml/2006/table">
@@ -5865,8 +5857,8 @@
                 <a:tableStyleId>{2D5ABB26-0587-4C30-8999-92F81FD0307C}</a:tableStyleId>
               </a:tblPr>
               <a:tblGrid>
-                <a:gridCol w="4876800"/>
-                <a:gridCol w="4876800"/>
+                <a:gridCol w="4381500"/>
+                <a:gridCol w="4381500"/>
               </a:tblGrid>
               <a:tr h="370840">
                 <a:tc>
@@ -5930,76 +5922,13 @@
       </p:graphicFrame>
       <p:sp>
         <p:nvSpPr>
-          <p:cNvPr id="94" name="TextBox 93"/>
-          <p:cNvSpPr txBox="1"/>
-          <p:nvPr/>
-        </p:nvSpPr>
-        <p:spPr>
-          <a:xfrm>
-            <a:off x="24307800" y="27864394"/>
-            <a:ext cx="11734800" cy="584776"/>
-          </a:xfrm>
-          <a:prstGeom prst="rect">
-            <a:avLst/>
-          </a:prstGeom>
-          <a:noFill/>
-        </p:spPr>
-        <p:txBody>
-          <a:bodyPr wrap="square" rtlCol="0">
-            <a:spAutoFit/>
-          </a:bodyPr>
-          <a:lstStyle/>
-          <a:p>
-            <a:pPr algn="ctr"/>
-            <a:r>
-              <a:rPr lang="en-US" sz="3200" dirty="0" smtClean="0">
-                <a:latin typeface="Cambria"/>
-                <a:cs typeface="Cambria"/>
-              </a:rPr>
-              <a:t>Most common championship game:          over          (72%)</a:t>
-            </a:r>
-          </a:p>
-        </p:txBody>
-      </p:sp>
-      <p:pic>
-        <p:nvPicPr>
-          <p:cNvPr id="95" name="Picture 94" descr="Duke.pdf"/>
-          <p:cNvPicPr>
-            <a:picLocks noChangeAspect="1"/>
-          </p:cNvPicPr>
-          <p:nvPr/>
-        </p:nvPicPr>
-        <p:blipFill>
-          <a:blip r:embed="rId9" cstate="print">
-            <a:extLst>
-              <a:ext uri="{28A0092B-C50C-407E-A947-70E740481C1C}">
-                <a14:useLocalDpi xmlns:a14="http://schemas.microsoft.com/office/drawing/2010/main" val="0"/>
-              </a:ext>
-            </a:extLst>
-          </a:blip>
-          <a:stretch>
-            <a:fillRect/>
-          </a:stretch>
-        </p:blipFill>
-        <p:spPr>
-          <a:xfrm>
-            <a:off x="33225559" y="27965400"/>
-            <a:ext cx="607241" cy="516155"/>
-          </a:xfrm>
-          <a:prstGeom prst="rect">
-            <a:avLst/>
-          </a:prstGeom>
-        </p:spPr>
-      </p:pic>
-      <p:sp>
-        <p:nvSpPr>
           <p:cNvPr id="16391" name="TextBox 16390"/>
           <p:cNvSpPr txBox="1"/>
           <p:nvPr/>
         </p:nvSpPr>
         <p:spPr>
           <a:xfrm>
-            <a:off x="24307800" y="23574494"/>
+            <a:off x="24307800" y="24565094"/>
             <a:ext cx="609599" cy="369332"/>
           </a:xfrm>
           <a:prstGeom prst="rect">
@@ -6038,7 +5967,7 @@
         </p:nvSpPr>
         <p:spPr>
           <a:xfrm>
-            <a:off x="24307800" y="24688800"/>
+            <a:off x="24307800" y="25679400"/>
             <a:ext cx="609599" cy="369332"/>
           </a:xfrm>
           <a:prstGeom prst="rect">
@@ -6077,7 +6006,7 @@
         </p:nvSpPr>
         <p:spPr>
           <a:xfrm>
-            <a:off x="24307800" y="25708094"/>
+            <a:off x="24307800" y="26698694"/>
             <a:ext cx="609599" cy="369332"/>
           </a:xfrm>
           <a:prstGeom prst="rect">
@@ -6116,7 +6045,7 @@
         </p:nvSpPr>
         <p:spPr>
           <a:xfrm>
-            <a:off x="24307800" y="26820614"/>
+            <a:off x="24307800" y="27811214"/>
             <a:ext cx="609599" cy="369332"/>
           </a:xfrm>
           <a:prstGeom prst="rect">
@@ -6147,66 +6076,6 @@
           </a:p>
         </p:txBody>
       </p:sp>
-      <p:pic>
-        <p:nvPicPr>
-          <p:cNvPr id="16392" name="Picture 16391" descr="Gonzaga.pdf"/>
-          <p:cNvPicPr>
-            <a:picLocks noChangeAspect="1"/>
-          </p:cNvPicPr>
-          <p:nvPr/>
-        </p:nvPicPr>
-        <p:blipFill>
-          <a:blip r:embed="rId12" cstate="print">
-            <a:extLst>
-              <a:ext uri="{28A0092B-C50C-407E-A947-70E740481C1C}">
-                <a14:useLocalDpi xmlns:a14="http://schemas.microsoft.com/office/drawing/2010/main" val="0"/>
-              </a:ext>
-            </a:extLst>
-          </a:blip>
-          <a:stretch>
-            <a:fillRect/>
-          </a:stretch>
-        </p:blipFill>
-        <p:spPr>
-          <a:xfrm>
-            <a:off x="26193750" y="14987523"/>
-            <a:ext cx="1222744" cy="914400"/>
-          </a:xfrm>
-          <a:prstGeom prst="rect">
-            <a:avLst/>
-          </a:prstGeom>
-        </p:spPr>
-      </p:pic>
-      <p:pic>
-        <p:nvPicPr>
-          <p:cNvPr id="16393" name="Picture 16392" descr="Arizona.pdf"/>
-          <p:cNvPicPr>
-            <a:picLocks noChangeAspect="1"/>
-          </p:cNvPicPr>
-          <p:nvPr/>
-        </p:nvPicPr>
-        <p:blipFill>
-          <a:blip r:embed="rId13" cstate="print">
-            <a:extLst>
-              <a:ext uri="{28A0092B-C50C-407E-A947-70E740481C1C}">
-                <a14:useLocalDpi xmlns:a14="http://schemas.microsoft.com/office/drawing/2010/main" val="0"/>
-              </a:ext>
-            </a:extLst>
-          </a:blip>
-          <a:stretch>
-            <a:fillRect/>
-          </a:stretch>
-        </p:blipFill>
-        <p:spPr>
-          <a:xfrm>
-            <a:off x="26365200" y="16230600"/>
-            <a:ext cx="989610" cy="914400"/>
-          </a:xfrm>
-          <a:prstGeom prst="rect">
-            <a:avLst/>
-          </a:prstGeom>
-        </p:spPr>
-      </p:pic>
       <p:graphicFrame>
         <p:nvGraphicFramePr>
           <p:cNvPr id="122" name="Table 121"/>
@@ -6216,14 +6085,14 @@
           <p:nvPr>
             <p:extLst>
               <p:ext uri="{D42A27DB-BD31-4B8C-83A1-F6EECF244321}">
-                <p14:modId xmlns:p14="http://schemas.microsoft.com/office/powerpoint/2010/main" val="4289673201"/>
+                <p14:modId xmlns:p14="http://schemas.microsoft.com/office/powerpoint/2010/main" val="2239197317"/>
               </p:ext>
             </p:extLst>
           </p:nvPr>
         </p:nvGraphicFramePr>
         <p:xfrm>
-          <a:off x="26289000" y="24460200"/>
-          <a:ext cx="9753600" cy="701040"/>
+          <a:off x="26670000" y="25450800"/>
+          <a:ext cx="8763000" cy="701040"/>
         </p:xfrm>
         <a:graphic>
           <a:graphicData uri="http://schemas.openxmlformats.org/drawingml/2006/table">
@@ -6232,8 +6101,8 @@
                 <a:tableStyleId>{2D5ABB26-0587-4C30-8999-92F81FD0307C}</a:tableStyleId>
               </a:tblPr>
               <a:tblGrid>
-                <a:gridCol w="4876800"/>
-                <a:gridCol w="4876800"/>
+                <a:gridCol w="4381500"/>
+                <a:gridCol w="4381500"/>
               </a:tblGrid>
               <a:tr h="370840">
                 <a:tc>
@@ -6304,14 +6173,14 @@
           <p:nvPr>
             <p:extLst>
               <p:ext uri="{D42A27DB-BD31-4B8C-83A1-F6EECF244321}">
-                <p14:modId xmlns:p14="http://schemas.microsoft.com/office/powerpoint/2010/main" val="1939520941"/>
+                <p14:modId xmlns:p14="http://schemas.microsoft.com/office/powerpoint/2010/main" val="3183746653"/>
               </p:ext>
             </p:extLst>
           </p:nvPr>
         </p:nvGraphicFramePr>
         <p:xfrm>
-          <a:off x="26289000" y="25542240"/>
-          <a:ext cx="9753600" cy="701040"/>
+          <a:off x="26670000" y="26532840"/>
+          <a:ext cx="8763000" cy="701040"/>
         </p:xfrm>
         <a:graphic>
           <a:graphicData uri="http://schemas.openxmlformats.org/drawingml/2006/table">
@@ -6320,8 +6189,8 @@
                 <a:tableStyleId>{2D5ABB26-0587-4C30-8999-92F81FD0307C}</a:tableStyleId>
               </a:tblPr>
               <a:tblGrid>
-                <a:gridCol w="4876800"/>
-                <a:gridCol w="4876800"/>
+                <a:gridCol w="4381500"/>
+                <a:gridCol w="4381500"/>
               </a:tblGrid>
               <a:tr h="370840">
                 <a:tc>
@@ -6392,14 +6261,14 @@
           <p:nvPr>
             <p:extLst>
               <p:ext uri="{D42A27DB-BD31-4B8C-83A1-F6EECF244321}">
-                <p14:modId xmlns:p14="http://schemas.microsoft.com/office/powerpoint/2010/main" val="3980289125"/>
+                <p14:modId xmlns:p14="http://schemas.microsoft.com/office/powerpoint/2010/main" val="2348773869"/>
               </p:ext>
             </p:extLst>
           </p:nvPr>
         </p:nvGraphicFramePr>
         <p:xfrm>
-          <a:off x="26289000" y="26654760"/>
-          <a:ext cx="9753600" cy="701040"/>
+          <a:off x="26670000" y="27645360"/>
+          <a:ext cx="8763000" cy="701040"/>
         </p:xfrm>
         <a:graphic>
           <a:graphicData uri="http://schemas.openxmlformats.org/drawingml/2006/table">
@@ -6408,8 +6277,8 @@
                 <a:tableStyleId>{2D5ABB26-0587-4C30-8999-92F81FD0307C}</a:tableStyleId>
               </a:tblPr>
               <a:tblGrid>
-                <a:gridCol w="4876800"/>
-                <a:gridCol w="4876800"/>
+                <a:gridCol w="4381500"/>
+                <a:gridCol w="4381500"/>
               </a:tblGrid>
               <a:tr h="370840">
                 <a:tc>
@@ -6503,36 +6372,6 @@
           </a:p>
         </p:txBody>
       </p:sp>
-      <p:pic>
-        <p:nvPicPr>
-          <p:cNvPr id="16394" name="Picture 16393" descr="Harvard.pdf"/>
-          <p:cNvPicPr>
-            <a:picLocks noChangeAspect="1"/>
-          </p:cNvPicPr>
-          <p:nvPr/>
-        </p:nvPicPr>
-        <p:blipFill>
-          <a:blip r:embed="rId14" cstate="print">
-            <a:extLst>
-              <a:ext uri="{28A0092B-C50C-407E-A947-70E740481C1C}">
-                <a14:useLocalDpi xmlns:a14="http://schemas.microsoft.com/office/drawing/2010/main" val="0"/>
-              </a:ext>
-            </a:extLst>
-          </a:blip>
-          <a:stretch>
-            <a:fillRect/>
-          </a:stretch>
-        </p:blipFill>
-        <p:spPr>
-          <a:xfrm>
-            <a:off x="26441400" y="17449800"/>
-            <a:ext cx="774675" cy="914400"/>
-          </a:xfrm>
-          <a:prstGeom prst="rect">
-            <a:avLst/>
-          </a:prstGeom>
-        </p:spPr>
-      </p:pic>
       <p:sp>
         <p:nvSpPr>
           <p:cNvPr id="130" name="TextBox 129"/>
@@ -6541,8 +6380,8 @@
         </p:nvSpPr>
         <p:spPr>
           <a:xfrm>
-            <a:off x="24307800" y="7848600"/>
-            <a:ext cx="11734800" cy="1815882"/>
+            <a:off x="24307800" y="7391400"/>
+            <a:ext cx="11734800" cy="1492716"/>
           </a:xfrm>
           <a:prstGeom prst="rect">
             <a:avLst/>
@@ -6564,7 +6403,7 @@
             </a:r>
           </a:p>
           <a:p>
-            <a:endParaRPr lang="en-US" sz="3200" dirty="0">
+            <a:endParaRPr lang="en-US" sz="1500" dirty="0">
               <a:latin typeface="Cambria"/>
               <a:cs typeface="Cambria"/>
             </a:endParaRPr>
@@ -6580,36 +6419,6 @@
           </a:p>
         </p:txBody>
       </p:sp>
-      <p:pic>
-        <p:nvPicPr>
-          <p:cNvPr id="131" name="Picture 130" descr="Kentucky.png"/>
-          <p:cNvPicPr>
-            <a:picLocks noChangeAspect="1"/>
-          </p:cNvPicPr>
-          <p:nvPr/>
-        </p:nvPicPr>
-        <p:blipFill>
-          <a:blip r:embed="rId15" cstate="print">
-            <a:extLst>
-              <a:ext uri="{28A0092B-C50C-407E-A947-70E740481C1C}">
-                <a14:useLocalDpi xmlns:a14="http://schemas.microsoft.com/office/drawing/2010/main" val="0"/>
-              </a:ext>
-            </a:extLst>
-          </a:blip>
-          <a:stretch>
-            <a:fillRect/>
-          </a:stretch>
-        </p:blipFill>
-        <p:spPr>
-          <a:xfrm>
-            <a:off x="31488224" y="27965400"/>
-            <a:ext cx="744376" cy="516155"/>
-          </a:xfrm>
-          <a:prstGeom prst="rect">
-            <a:avLst/>
-          </a:prstGeom>
-        </p:spPr>
-      </p:pic>
       <p:sp>
         <p:nvSpPr>
           <p:cNvPr id="56" name="TextBox 55"/>
@@ -6665,7 +6474,7 @@
             <p:nvPr/>
           </p:nvPicPr>
           <p:blipFill>
-            <a:blip r:embed="rId16">
+            <a:blip r:embed="rId12">
               <a:extLst>
                 <a:ext uri="{28A0092B-C50C-407E-A947-70E740481C1C}">
                   <a14:useLocalDpi xmlns:a14="http://schemas.microsoft.com/office/drawing/2010/main" val="0"/>
@@ -6695,7 +6504,7 @@
             <p:nvPr/>
           </p:nvPicPr>
           <p:blipFill>
-            <a:blip r:embed="rId17">
+            <a:blip r:embed="rId13">
               <a:extLst>
                 <a:ext uri="{28A0092B-C50C-407E-A947-70E740481C1C}">
                   <a14:useLocalDpi xmlns:a14="http://schemas.microsoft.com/office/drawing/2010/main" val="0"/>
@@ -6811,7 +6620,7 @@
             <p:nvPr/>
           </p:nvPicPr>
           <p:blipFill>
-            <a:blip r:embed="rId18">
+            <a:blip r:embed="rId14">
               <a:extLst>
                 <a:ext uri="{28A0092B-C50C-407E-A947-70E740481C1C}">
                   <a14:useLocalDpi xmlns:a14="http://schemas.microsoft.com/office/drawing/2010/main" val="0"/>
@@ -7305,6 +7114,1196 @@
           </a:graphicData>
         </a:graphic>
       </p:graphicFrame>
+      <p:sp>
+        <p:nvSpPr>
+          <p:cNvPr id="70" name="TextBox 69"/>
+          <p:cNvSpPr txBox="1"/>
+          <p:nvPr/>
+        </p:nvSpPr>
+        <p:spPr>
+          <a:xfrm>
+            <a:off x="24307800" y="10672842"/>
+            <a:ext cx="11734800" cy="1985159"/>
+          </a:xfrm>
+          <a:prstGeom prst="rect">
+            <a:avLst/>
+          </a:prstGeom>
+          <a:noFill/>
+        </p:spPr>
+        <p:txBody>
+          <a:bodyPr wrap="square" rtlCol="0">
+            <a:spAutoFit/>
+          </a:bodyPr>
+          <a:lstStyle/>
+          <a:p>
+            <a:r>
+              <a:rPr lang="en-US" sz="4400" b="1" u="sng" dirty="0" smtClean="0">
+                <a:latin typeface="Cambria"/>
+                <a:cs typeface="Cambria"/>
+              </a:rPr>
+              <a:t>Anyone’s Game</a:t>
+            </a:r>
+          </a:p>
+          <a:p>
+            <a:endParaRPr lang="en-US" sz="1500" dirty="0">
+              <a:latin typeface="Cambria"/>
+              <a:cs typeface="Cambria"/>
+            </a:endParaRPr>
+          </a:p>
+          <a:p>
+            <a:r>
+              <a:rPr lang="en-US" sz="3200" dirty="0" smtClean="0">
+                <a:latin typeface="Cambria"/>
+                <a:cs typeface="Cambria"/>
+              </a:rPr>
+              <a:t>We used our model to simulate the entire 2015 NCAA Tournament 10,000 times. The most likely winners:</a:t>
+            </a:r>
+          </a:p>
+        </p:txBody>
+      </p:sp>
+      <p:sp>
+        <p:nvSpPr>
+          <p:cNvPr id="71" name="TextBox 70"/>
+          <p:cNvSpPr txBox="1"/>
+          <p:nvPr/>
+        </p:nvSpPr>
+        <p:spPr>
+          <a:xfrm>
+            <a:off x="24307800" y="20731242"/>
+            <a:ext cx="11734800" cy="584776"/>
+          </a:xfrm>
+          <a:prstGeom prst="rect">
+            <a:avLst/>
+          </a:prstGeom>
+          <a:noFill/>
+        </p:spPr>
+        <p:txBody>
+          <a:bodyPr wrap="square" rtlCol="0">
+            <a:spAutoFit/>
+          </a:bodyPr>
+          <a:lstStyle/>
+          <a:p>
+            <a:pPr algn="ctr"/>
+            <a:r>
+              <a:rPr lang="en-US" sz="3200" dirty="0" smtClean="0">
+                <a:latin typeface="Cambria"/>
+                <a:cs typeface="Cambria"/>
+              </a:rPr>
+              <a:t>Most common championship outcome:           over         (24%)</a:t>
+            </a:r>
+          </a:p>
+        </p:txBody>
+      </p:sp>
+      <p:pic>
+        <p:nvPicPr>
+          <p:cNvPr id="72" name="Picture 71" descr="Arizona.pdf"/>
+          <p:cNvPicPr>
+            <a:picLocks noChangeAspect="1"/>
+          </p:cNvPicPr>
+          <p:nvPr/>
+        </p:nvPicPr>
+        <p:blipFill>
+          <a:blip r:embed="rId15">
+            <a:extLst>
+              <a:ext uri="{28A0092B-C50C-407E-A947-70E740481C1C}">
+                <a14:useLocalDpi xmlns:a14="http://schemas.microsoft.com/office/drawing/2010/main" val="0"/>
+              </a:ext>
+            </a:extLst>
+          </a:blip>
+          <a:stretch>
+            <a:fillRect/>
+          </a:stretch>
+        </p:blipFill>
+        <p:spPr>
+          <a:xfrm>
+            <a:off x="25134841" y="16714966"/>
+            <a:ext cx="989610" cy="914400"/>
+          </a:xfrm>
+          <a:prstGeom prst="rect">
+            <a:avLst/>
+          </a:prstGeom>
+        </p:spPr>
+      </p:pic>
+      <p:pic>
+        <p:nvPicPr>
+          <p:cNvPr id="73" name="Picture 72" descr="Harvard.pdf"/>
+          <p:cNvPicPr>
+            <a:picLocks noChangeAspect="1"/>
+          </p:cNvPicPr>
+          <p:nvPr/>
+        </p:nvPicPr>
+        <p:blipFill>
+          <a:blip r:embed="rId16">
+            <a:extLst>
+              <a:ext uri="{28A0092B-C50C-407E-A947-70E740481C1C}">
+                <a14:useLocalDpi xmlns:a14="http://schemas.microsoft.com/office/drawing/2010/main" val="0"/>
+              </a:ext>
+            </a:extLst>
+          </a:blip>
+          <a:stretch>
+            <a:fillRect/>
+          </a:stretch>
+        </p:blipFill>
+        <p:spPr>
+          <a:xfrm>
+            <a:off x="25247599" y="19727940"/>
+            <a:ext cx="774676" cy="914400"/>
+          </a:xfrm>
+          <a:prstGeom prst="rect">
+            <a:avLst/>
+          </a:prstGeom>
+        </p:spPr>
+      </p:pic>
+      <p:pic>
+        <p:nvPicPr>
+          <p:cNvPr id="75" name="Picture 74" descr="Kentucky.png"/>
+          <p:cNvPicPr>
+            <a:picLocks noChangeAspect="1"/>
+          </p:cNvPicPr>
+          <p:nvPr/>
+        </p:nvPicPr>
+        <p:blipFill>
+          <a:blip r:embed="rId17" cstate="print">
+            <a:extLst>
+              <a:ext uri="{28A0092B-C50C-407E-A947-70E740481C1C}">
+                <a14:useLocalDpi xmlns:a14="http://schemas.microsoft.com/office/drawing/2010/main" val="0"/>
+              </a:ext>
+            </a:extLst>
+          </a:blip>
+          <a:stretch>
+            <a:fillRect/>
+          </a:stretch>
+        </p:blipFill>
+        <p:spPr>
+          <a:xfrm>
+            <a:off x="31775400" y="20819845"/>
+            <a:ext cx="744376" cy="516155"/>
+          </a:xfrm>
+          <a:prstGeom prst="rect">
+            <a:avLst/>
+          </a:prstGeom>
+        </p:spPr>
+      </p:pic>
+      <p:pic>
+        <p:nvPicPr>
+          <p:cNvPr id="77" name="Picture 76" descr="Villanova.pdf"/>
+          <p:cNvPicPr>
+            <a:picLocks noChangeAspect="1"/>
+          </p:cNvPicPr>
+          <p:nvPr/>
+        </p:nvPicPr>
+        <p:blipFill>
+          <a:blip r:embed="rId18">
+            <a:extLst>
+              <a:ext uri="{28A0092B-C50C-407E-A947-70E740481C1C}">
+                <a14:useLocalDpi xmlns:a14="http://schemas.microsoft.com/office/drawing/2010/main" val="0"/>
+              </a:ext>
+            </a:extLst>
+          </a:blip>
+          <a:stretch>
+            <a:fillRect/>
+          </a:stretch>
+        </p:blipFill>
+        <p:spPr>
+          <a:xfrm>
+            <a:off x="25115605" y="15648166"/>
+            <a:ext cx="1028082" cy="914400"/>
+          </a:xfrm>
+          <a:prstGeom prst="rect">
+            <a:avLst/>
+          </a:prstGeom>
+        </p:spPr>
+      </p:pic>
+      <p:pic>
+        <p:nvPicPr>
+          <p:cNvPr id="82" name="Picture 81" descr="Villanova.pdf"/>
+          <p:cNvPicPr>
+            <a:picLocks noChangeAspect="1"/>
+          </p:cNvPicPr>
+          <p:nvPr/>
+        </p:nvPicPr>
+        <p:blipFill>
+          <a:blip r:embed="rId18">
+            <a:extLst>
+              <a:ext uri="{28A0092B-C50C-407E-A947-70E740481C1C}">
+                <a14:useLocalDpi xmlns:a14="http://schemas.microsoft.com/office/drawing/2010/main" val="0"/>
+              </a:ext>
+            </a:extLst>
+          </a:blip>
+          <a:stretch>
+            <a:fillRect/>
+          </a:stretch>
+        </p:blipFill>
+        <p:spPr>
+          <a:xfrm>
+            <a:off x="33557274" y="20819845"/>
+            <a:ext cx="580326" cy="516155"/>
+          </a:xfrm>
+          <a:prstGeom prst="rect">
+            <a:avLst/>
+          </a:prstGeom>
+        </p:spPr>
+      </p:pic>
+      <p:pic>
+        <p:nvPicPr>
+          <p:cNvPr id="84" name="Picture 83" descr="Wisconsin.pdf"/>
+          <p:cNvPicPr>
+            <a:picLocks noChangeAspect="1"/>
+          </p:cNvPicPr>
+          <p:nvPr/>
+        </p:nvPicPr>
+        <p:blipFill>
+          <a:blip r:embed="rId8">
+            <a:extLst>
+              <a:ext uri="{28A0092B-C50C-407E-A947-70E740481C1C}">
+                <a14:useLocalDpi xmlns:a14="http://schemas.microsoft.com/office/drawing/2010/main" val="0"/>
+              </a:ext>
+            </a:extLst>
+          </a:blip>
+          <a:stretch>
+            <a:fillRect/>
+          </a:stretch>
+        </p:blipFill>
+        <p:spPr>
+          <a:xfrm>
+            <a:off x="25100257" y="14505166"/>
+            <a:ext cx="1058779" cy="1005840"/>
+          </a:xfrm>
+          <a:prstGeom prst="rect">
+            <a:avLst/>
+          </a:prstGeom>
+        </p:spPr>
+      </p:pic>
+      <p:pic>
+        <p:nvPicPr>
+          <p:cNvPr id="85" name="Picture 84" descr="Kentucky.png"/>
+          <p:cNvPicPr>
+            <a:picLocks noChangeAspect="1"/>
+          </p:cNvPicPr>
+          <p:nvPr/>
+        </p:nvPicPr>
+        <p:blipFill>
+          <a:blip r:embed="rId17" cstate="print">
+            <a:extLst>
+              <a:ext uri="{28A0092B-C50C-407E-A947-70E740481C1C}">
+                <a14:useLocalDpi xmlns:a14="http://schemas.microsoft.com/office/drawing/2010/main" val="0"/>
+              </a:ext>
+            </a:extLst>
+          </a:blip>
+          <a:stretch>
+            <a:fillRect/>
+          </a:stretch>
+        </p:blipFill>
+        <p:spPr>
+          <a:xfrm>
+            <a:off x="24970293" y="13438366"/>
+            <a:ext cx="1318707" cy="914400"/>
+          </a:xfrm>
+          <a:prstGeom prst="rect">
+            <a:avLst/>
+          </a:prstGeom>
+        </p:spPr>
+      </p:pic>
+      <p:graphicFrame>
+        <p:nvGraphicFramePr>
+          <p:cNvPr id="86" name="Table 85"/>
+          <p:cNvGraphicFramePr>
+            <a:graphicFrameLocks noGrp="1"/>
+          </p:cNvGraphicFramePr>
+          <p:nvPr>
+            <p:extLst>
+              <p:ext uri="{D42A27DB-BD31-4B8C-83A1-F6EECF244321}">
+                <p14:modId xmlns:p14="http://schemas.microsoft.com/office/powerpoint/2010/main" val="2842001159"/>
+              </p:ext>
+            </p:extLst>
+          </p:nvPr>
+        </p:nvGraphicFramePr>
+        <p:xfrm>
+          <a:off x="26670000" y="12826134"/>
+          <a:ext cx="8763000" cy="579120"/>
+        </p:xfrm>
+        <a:graphic>
+          <a:graphicData uri="http://schemas.openxmlformats.org/drawingml/2006/table">
+            <a:tbl>
+              <a:tblPr firstRow="1" bandRow="1">
+                <a:tableStyleId>{2D5ABB26-0587-4C30-8999-92F81FD0307C}</a:tableStyleId>
+              </a:tblPr>
+              <a:tblGrid>
+                <a:gridCol w="4381500"/>
+                <a:gridCol w="4381500"/>
+              </a:tblGrid>
+              <a:tr h="370840">
+                <a:tc>
+                  <a:txBody>
+                    <a:bodyPr/>
+                    <a:lstStyle/>
+                    <a:p>
+                      <a:pPr algn="ctr"/>
+                      <a:r>
+                        <a:rPr lang="en-US" sz="3200" b="1" u="none" dirty="0" smtClean="0">
+                          <a:latin typeface="Helvetica"/>
+                          <a:cs typeface="Helvetica"/>
+                        </a:rPr>
+                        <a:t>Final Four</a:t>
+                      </a:r>
+                      <a:endParaRPr lang="en-US" sz="3200" b="1" u="none" dirty="0">
+                        <a:latin typeface="Helvetica"/>
+                        <a:cs typeface="Helvetica"/>
+                      </a:endParaRPr>
+                    </a:p>
+                  </a:txBody>
+                  <a:tcPr/>
+                </a:tc>
+                <a:tc>
+                  <a:txBody>
+                    <a:bodyPr/>
+                    <a:lstStyle/>
+                    <a:p>
+                      <a:pPr algn="ctr"/>
+                      <a:r>
+                        <a:rPr lang="en-US" sz="3200" b="1" u="none" dirty="0" smtClean="0">
+                          <a:latin typeface="Helvetica"/>
+                          <a:cs typeface="Helvetica"/>
+                        </a:rPr>
+                        <a:t>Championship</a:t>
+                      </a:r>
+                      <a:endParaRPr lang="en-US" sz="3200" b="1" u="none" dirty="0">
+                        <a:latin typeface="Helvetica"/>
+                        <a:cs typeface="Helvetica"/>
+                      </a:endParaRPr>
+                    </a:p>
+                  </a:txBody>
+                  <a:tcPr/>
+                </a:tc>
+              </a:tr>
+            </a:tbl>
+          </a:graphicData>
+        </a:graphic>
+      </p:graphicFrame>
+      <p:graphicFrame>
+        <p:nvGraphicFramePr>
+          <p:cNvPr id="87" name="Table 86"/>
+          <p:cNvGraphicFramePr>
+            <a:graphicFrameLocks noGrp="1"/>
+          </p:cNvGraphicFramePr>
+          <p:nvPr>
+            <p:extLst>
+              <p:ext uri="{D42A27DB-BD31-4B8C-83A1-F6EECF244321}">
+                <p14:modId xmlns:p14="http://schemas.microsoft.com/office/powerpoint/2010/main" val="1203284766"/>
+              </p:ext>
+            </p:extLst>
+          </p:nvPr>
+        </p:nvGraphicFramePr>
+        <p:xfrm>
+          <a:off x="26670000" y="13541860"/>
+          <a:ext cx="8763000" cy="701040"/>
+        </p:xfrm>
+        <a:graphic>
+          <a:graphicData uri="http://schemas.openxmlformats.org/drawingml/2006/table">
+            <a:tbl>
+              <a:tblPr firstRow="1" bandRow="1">
+                <a:tableStyleId>{2D5ABB26-0587-4C30-8999-92F81FD0307C}</a:tableStyleId>
+              </a:tblPr>
+              <a:tblGrid>
+                <a:gridCol w="4381500"/>
+                <a:gridCol w="4381500"/>
+              </a:tblGrid>
+              <a:tr h="370840">
+                <a:tc>
+                  <a:txBody>
+                    <a:bodyPr/>
+                    <a:lstStyle/>
+                    <a:p>
+                      <a:pPr algn="ctr"/>
+                      <a:r>
+                        <a:rPr lang="en-US" sz="4000" b="0" u="none" dirty="0" smtClean="0">
+                          <a:latin typeface="Helvetica"/>
+                          <a:cs typeface="Helvetica"/>
+                        </a:rPr>
+                        <a:t>99%</a:t>
+                      </a:r>
+                      <a:endParaRPr lang="en-US" sz="4000" b="0" u="none" dirty="0">
+                        <a:latin typeface="Helvetica"/>
+                        <a:cs typeface="Helvetica"/>
+                      </a:endParaRPr>
+                    </a:p>
+                  </a:txBody>
+                  <a:tcPr/>
+                </a:tc>
+                <a:tc>
+                  <a:txBody>
+                    <a:bodyPr/>
+                    <a:lstStyle/>
+                    <a:p>
+                      <a:pPr marL="0" marR="0" indent="0" algn="ctr" defTabSz="914400" rtl="0" eaLnBrk="1" fontAlgn="auto" latinLnBrk="0" hangingPunct="1">
+                        <a:lnSpc>
+                          <a:spcPct val="100000"/>
+                        </a:lnSpc>
+                        <a:spcBef>
+                          <a:spcPts val="0"/>
+                        </a:spcBef>
+                        <a:spcAft>
+                          <a:spcPts val="0"/>
+                        </a:spcAft>
+                        <a:buClrTx/>
+                        <a:buSzTx/>
+                        <a:buFontTx/>
+                        <a:buNone/>
+                        <a:tabLst/>
+                        <a:defRPr/>
+                      </a:pPr>
+                      <a:r>
+                        <a:rPr lang="en-US" sz="4000" b="0" u="none" dirty="0" smtClean="0">
+                          <a:latin typeface="Helvetica"/>
+                          <a:cs typeface="Helvetica"/>
+                        </a:rPr>
+                        <a:t>77%</a:t>
+                      </a:r>
+                    </a:p>
+                  </a:txBody>
+                  <a:tcPr/>
+                </a:tc>
+              </a:tr>
+            </a:tbl>
+          </a:graphicData>
+        </a:graphic>
+      </p:graphicFrame>
+      <p:sp>
+        <p:nvSpPr>
+          <p:cNvPr id="88" name="TextBox 87"/>
+          <p:cNvSpPr txBox="1"/>
+          <p:nvPr/>
+        </p:nvSpPr>
+        <p:spPr>
+          <a:xfrm>
+            <a:off x="24307800" y="13710900"/>
+            <a:ext cx="609599" cy="369332"/>
+          </a:xfrm>
+          <a:prstGeom prst="rect">
+            <a:avLst/>
+          </a:prstGeom>
+          <a:noFill/>
+        </p:spPr>
+        <p:txBody>
+          <a:bodyPr wrap="square" rtlCol="0">
+            <a:spAutoFit/>
+          </a:bodyPr>
+          <a:lstStyle/>
+          <a:p>
+            <a:pPr algn="r"/>
+            <a:r>
+              <a:rPr lang="en-US" sz="1800" dirty="0" smtClean="0">
+                <a:solidFill>
+                  <a:schemeClr val="bg2"/>
+                </a:solidFill>
+              </a:rPr>
+              <a:t>(1)</a:t>
+            </a:r>
+            <a:endParaRPr lang="en-US" sz="1800" dirty="0">
+              <a:solidFill>
+                <a:schemeClr val="bg2"/>
+              </a:solidFill>
+            </a:endParaRPr>
+          </a:p>
+        </p:txBody>
+      </p:sp>
+      <p:sp>
+        <p:nvSpPr>
+          <p:cNvPr id="89" name="TextBox 88"/>
+          <p:cNvSpPr txBox="1"/>
+          <p:nvPr/>
+        </p:nvSpPr>
+        <p:spPr>
+          <a:xfrm>
+            <a:off x="24307800" y="14825206"/>
+            <a:ext cx="609599" cy="369332"/>
+          </a:xfrm>
+          <a:prstGeom prst="rect">
+            <a:avLst/>
+          </a:prstGeom>
+          <a:noFill/>
+        </p:spPr>
+        <p:txBody>
+          <a:bodyPr wrap="square" rtlCol="0">
+            <a:spAutoFit/>
+          </a:bodyPr>
+          <a:lstStyle/>
+          <a:p>
+            <a:pPr algn="r"/>
+            <a:r>
+              <a:rPr lang="en-US" sz="1800" dirty="0" smtClean="0">
+                <a:solidFill>
+                  <a:schemeClr val="bg2"/>
+                </a:solidFill>
+              </a:rPr>
+              <a:t>(1)</a:t>
+            </a:r>
+            <a:endParaRPr lang="en-US" sz="1800" dirty="0">
+              <a:solidFill>
+                <a:schemeClr val="bg2"/>
+              </a:solidFill>
+            </a:endParaRPr>
+          </a:p>
+        </p:txBody>
+      </p:sp>
+      <p:sp>
+        <p:nvSpPr>
+          <p:cNvPr id="90" name="TextBox 89"/>
+          <p:cNvSpPr txBox="1"/>
+          <p:nvPr/>
+        </p:nvSpPr>
+        <p:spPr>
+          <a:xfrm>
+            <a:off x="24307800" y="15917942"/>
+            <a:ext cx="609599" cy="369332"/>
+          </a:xfrm>
+          <a:prstGeom prst="rect">
+            <a:avLst/>
+          </a:prstGeom>
+          <a:noFill/>
+        </p:spPr>
+        <p:txBody>
+          <a:bodyPr wrap="square" rtlCol="0">
+            <a:spAutoFit/>
+          </a:bodyPr>
+          <a:lstStyle/>
+          <a:p>
+            <a:pPr algn="r"/>
+            <a:r>
+              <a:rPr lang="en-US" sz="1800" dirty="0" smtClean="0">
+                <a:solidFill>
+                  <a:schemeClr val="bg2"/>
+                </a:solidFill>
+              </a:rPr>
+              <a:t>(1)</a:t>
+            </a:r>
+            <a:endParaRPr lang="en-US" sz="1800" dirty="0">
+              <a:solidFill>
+                <a:schemeClr val="bg2"/>
+              </a:solidFill>
+            </a:endParaRPr>
+          </a:p>
+        </p:txBody>
+      </p:sp>
+      <p:sp>
+        <p:nvSpPr>
+          <p:cNvPr id="91" name="TextBox 90"/>
+          <p:cNvSpPr txBox="1"/>
+          <p:nvPr/>
+        </p:nvSpPr>
+        <p:spPr>
+          <a:xfrm>
+            <a:off x="24307800" y="16982420"/>
+            <a:ext cx="609599" cy="369332"/>
+          </a:xfrm>
+          <a:prstGeom prst="rect">
+            <a:avLst/>
+          </a:prstGeom>
+          <a:noFill/>
+        </p:spPr>
+        <p:txBody>
+          <a:bodyPr wrap="square" rtlCol="0">
+            <a:spAutoFit/>
+          </a:bodyPr>
+          <a:lstStyle/>
+          <a:p>
+            <a:pPr algn="r"/>
+            <a:r>
+              <a:rPr lang="en-US" sz="1800" dirty="0" smtClean="0">
+                <a:solidFill>
+                  <a:schemeClr val="bg2"/>
+                </a:solidFill>
+              </a:rPr>
+              <a:t>(2)</a:t>
+            </a:r>
+            <a:endParaRPr lang="en-US" sz="1800" dirty="0">
+              <a:solidFill>
+                <a:schemeClr val="bg2"/>
+              </a:solidFill>
+            </a:endParaRPr>
+          </a:p>
+        </p:txBody>
+      </p:sp>
+      <p:graphicFrame>
+        <p:nvGraphicFramePr>
+          <p:cNvPr id="92" name="Table 91"/>
+          <p:cNvGraphicFramePr>
+            <a:graphicFrameLocks noGrp="1"/>
+          </p:cNvGraphicFramePr>
+          <p:nvPr>
+            <p:extLst>
+              <p:ext uri="{D42A27DB-BD31-4B8C-83A1-F6EECF244321}">
+                <p14:modId xmlns:p14="http://schemas.microsoft.com/office/powerpoint/2010/main" val="876822068"/>
+              </p:ext>
+            </p:extLst>
+          </p:nvPr>
+        </p:nvGraphicFramePr>
+        <p:xfrm>
+          <a:off x="26670000" y="14593420"/>
+          <a:ext cx="8763000" cy="701040"/>
+        </p:xfrm>
+        <a:graphic>
+          <a:graphicData uri="http://schemas.openxmlformats.org/drawingml/2006/table">
+            <a:tbl>
+              <a:tblPr firstRow="1" bandRow="1">
+                <a:tableStyleId>{2D5ABB26-0587-4C30-8999-92F81FD0307C}</a:tableStyleId>
+              </a:tblPr>
+              <a:tblGrid>
+                <a:gridCol w="4381500"/>
+                <a:gridCol w="4381500"/>
+              </a:tblGrid>
+              <a:tr h="370840">
+                <a:tc>
+                  <a:txBody>
+                    <a:bodyPr/>
+                    <a:lstStyle/>
+                    <a:p>
+                      <a:pPr algn="ctr"/>
+                      <a:r>
+                        <a:rPr lang="en-US" sz="4000" b="0" u="none" dirty="0" smtClean="0">
+                          <a:latin typeface="Helvetica"/>
+                          <a:cs typeface="Helvetica"/>
+                        </a:rPr>
+                        <a:t>52%</a:t>
+                      </a:r>
+                      <a:endParaRPr lang="en-US" sz="4000" b="0" u="none" dirty="0">
+                        <a:latin typeface="Helvetica"/>
+                        <a:cs typeface="Helvetica"/>
+                      </a:endParaRPr>
+                    </a:p>
+                  </a:txBody>
+                  <a:tcPr/>
+                </a:tc>
+                <a:tc>
+                  <a:txBody>
+                    <a:bodyPr/>
+                    <a:lstStyle/>
+                    <a:p>
+                      <a:pPr marL="0" marR="0" indent="0" algn="ctr" defTabSz="914400" rtl="0" eaLnBrk="1" fontAlgn="auto" latinLnBrk="0" hangingPunct="1">
+                        <a:lnSpc>
+                          <a:spcPct val="100000"/>
+                        </a:lnSpc>
+                        <a:spcBef>
+                          <a:spcPts val="0"/>
+                        </a:spcBef>
+                        <a:spcAft>
+                          <a:spcPts val="0"/>
+                        </a:spcAft>
+                        <a:buClrTx/>
+                        <a:buSzTx/>
+                        <a:buFontTx/>
+                        <a:buNone/>
+                        <a:tabLst/>
+                        <a:defRPr/>
+                      </a:pPr>
+                      <a:r>
+                        <a:rPr lang="en-US" sz="4000" b="0" u="none" dirty="0" smtClean="0">
+                          <a:latin typeface="Helvetica"/>
+                          <a:cs typeface="Helvetica"/>
+                        </a:rPr>
+                        <a:t>12%</a:t>
+                      </a:r>
+                    </a:p>
+                  </a:txBody>
+                  <a:tcPr/>
+                </a:tc>
+              </a:tr>
+            </a:tbl>
+          </a:graphicData>
+        </a:graphic>
+      </p:graphicFrame>
+      <p:graphicFrame>
+        <p:nvGraphicFramePr>
+          <p:cNvPr id="96" name="Table 95"/>
+          <p:cNvGraphicFramePr>
+            <a:graphicFrameLocks noGrp="1"/>
+          </p:cNvGraphicFramePr>
+          <p:nvPr>
+            <p:extLst>
+              <p:ext uri="{D42A27DB-BD31-4B8C-83A1-F6EECF244321}">
+                <p14:modId xmlns:p14="http://schemas.microsoft.com/office/powerpoint/2010/main" val="2895403599"/>
+              </p:ext>
+            </p:extLst>
+          </p:nvPr>
+        </p:nvGraphicFramePr>
+        <p:xfrm>
+          <a:off x="26670000" y="15700860"/>
+          <a:ext cx="8763000" cy="701040"/>
+        </p:xfrm>
+        <a:graphic>
+          <a:graphicData uri="http://schemas.openxmlformats.org/drawingml/2006/table">
+            <a:tbl>
+              <a:tblPr firstRow="1" bandRow="1">
+                <a:tableStyleId>{2D5ABB26-0587-4C30-8999-92F81FD0307C}</a:tableStyleId>
+              </a:tblPr>
+              <a:tblGrid>
+                <a:gridCol w="4381500"/>
+                <a:gridCol w="4381500"/>
+              </a:tblGrid>
+              <a:tr h="370840">
+                <a:tc>
+                  <a:txBody>
+                    <a:bodyPr/>
+                    <a:lstStyle/>
+                    <a:p>
+                      <a:pPr algn="ctr"/>
+                      <a:r>
+                        <a:rPr lang="en-US" sz="4000" b="0" u="none" dirty="0" smtClean="0">
+                          <a:latin typeface="Helvetica"/>
+                          <a:cs typeface="Helvetica"/>
+                        </a:rPr>
+                        <a:t>56%</a:t>
+                      </a:r>
+                      <a:endParaRPr lang="en-US" sz="4000" b="0" u="none" dirty="0">
+                        <a:latin typeface="Helvetica"/>
+                        <a:cs typeface="Helvetica"/>
+                      </a:endParaRPr>
+                    </a:p>
+                  </a:txBody>
+                  <a:tcPr/>
+                </a:tc>
+                <a:tc>
+                  <a:txBody>
+                    <a:bodyPr/>
+                    <a:lstStyle/>
+                    <a:p>
+                      <a:pPr marL="0" marR="0" indent="0" algn="ctr" defTabSz="914400" rtl="0" eaLnBrk="1" fontAlgn="auto" latinLnBrk="0" hangingPunct="1">
+                        <a:lnSpc>
+                          <a:spcPct val="100000"/>
+                        </a:lnSpc>
+                        <a:spcBef>
+                          <a:spcPts val="0"/>
+                        </a:spcBef>
+                        <a:spcAft>
+                          <a:spcPts val="0"/>
+                        </a:spcAft>
+                        <a:buClrTx/>
+                        <a:buSzTx/>
+                        <a:buFontTx/>
+                        <a:buNone/>
+                        <a:tabLst/>
+                        <a:defRPr/>
+                      </a:pPr>
+                      <a:r>
+                        <a:rPr lang="en-US" sz="4000" b="0" u="none" dirty="0" smtClean="0">
+                          <a:latin typeface="Helvetica"/>
+                          <a:cs typeface="Helvetica"/>
+                        </a:rPr>
+                        <a:t>4.8%</a:t>
+                      </a:r>
+                    </a:p>
+                  </a:txBody>
+                  <a:tcPr/>
+                </a:tc>
+              </a:tr>
+            </a:tbl>
+          </a:graphicData>
+        </a:graphic>
+      </p:graphicFrame>
+      <p:graphicFrame>
+        <p:nvGraphicFramePr>
+          <p:cNvPr id="97" name="Table 96"/>
+          <p:cNvGraphicFramePr>
+            <a:graphicFrameLocks noGrp="1"/>
+          </p:cNvGraphicFramePr>
+          <p:nvPr>
+            <p:extLst>
+              <p:ext uri="{D42A27DB-BD31-4B8C-83A1-F6EECF244321}">
+                <p14:modId xmlns:p14="http://schemas.microsoft.com/office/powerpoint/2010/main" val="3133749223"/>
+              </p:ext>
+            </p:extLst>
+          </p:nvPr>
+        </p:nvGraphicFramePr>
+        <p:xfrm>
+          <a:off x="26670000" y="16787980"/>
+          <a:ext cx="8763000" cy="701040"/>
+        </p:xfrm>
+        <a:graphic>
+          <a:graphicData uri="http://schemas.openxmlformats.org/drawingml/2006/table">
+            <a:tbl>
+              <a:tblPr firstRow="1" bandRow="1">
+                <a:tableStyleId>{2D5ABB26-0587-4C30-8999-92F81FD0307C}</a:tableStyleId>
+              </a:tblPr>
+              <a:tblGrid>
+                <a:gridCol w="4381500"/>
+                <a:gridCol w="4381500"/>
+              </a:tblGrid>
+              <a:tr h="370840">
+                <a:tc>
+                  <a:txBody>
+                    <a:bodyPr/>
+                    <a:lstStyle/>
+                    <a:p>
+                      <a:pPr algn="ctr"/>
+                      <a:r>
+                        <a:rPr lang="en-US" sz="4000" b="0" u="none" dirty="0" smtClean="0">
+                          <a:latin typeface="Helvetica"/>
+                          <a:cs typeface="Helvetica"/>
+                        </a:rPr>
+                        <a:t>48%</a:t>
+                      </a:r>
+                      <a:endParaRPr lang="en-US" sz="4000" b="0" u="none" dirty="0">
+                        <a:latin typeface="Helvetica"/>
+                        <a:cs typeface="Helvetica"/>
+                      </a:endParaRPr>
+                    </a:p>
+                  </a:txBody>
+                  <a:tcPr/>
+                </a:tc>
+                <a:tc>
+                  <a:txBody>
+                    <a:bodyPr/>
+                    <a:lstStyle/>
+                    <a:p>
+                      <a:pPr marL="0" marR="0" indent="0" algn="ctr" defTabSz="914400" rtl="0" eaLnBrk="1" fontAlgn="auto" latinLnBrk="0" hangingPunct="1">
+                        <a:lnSpc>
+                          <a:spcPct val="100000"/>
+                        </a:lnSpc>
+                        <a:spcBef>
+                          <a:spcPts val="0"/>
+                        </a:spcBef>
+                        <a:spcAft>
+                          <a:spcPts val="0"/>
+                        </a:spcAft>
+                        <a:buClrTx/>
+                        <a:buSzTx/>
+                        <a:buFontTx/>
+                        <a:buNone/>
+                        <a:tabLst/>
+                        <a:defRPr/>
+                      </a:pPr>
+                      <a:r>
+                        <a:rPr lang="en-US" sz="4000" b="0" u="none" dirty="0" smtClean="0">
+                          <a:latin typeface="Helvetica"/>
+                          <a:cs typeface="Helvetica"/>
+                        </a:rPr>
+                        <a:t>2.5%</a:t>
+                      </a:r>
+                    </a:p>
+                  </a:txBody>
+                  <a:tcPr/>
+                </a:tc>
+              </a:tr>
+            </a:tbl>
+          </a:graphicData>
+        </a:graphic>
+      </p:graphicFrame>
+      <p:pic>
+        <p:nvPicPr>
+          <p:cNvPr id="98" name="Picture 97" descr="Virginia.pdf"/>
+          <p:cNvPicPr>
+            <a:picLocks noChangeAspect="1"/>
+          </p:cNvPicPr>
+          <p:nvPr/>
+        </p:nvPicPr>
+        <p:blipFill>
+          <a:blip r:embed="rId19">
+            <a:extLst>
+              <a:ext uri="{28A0092B-C50C-407E-A947-70E740481C1C}">
+                <a14:useLocalDpi xmlns:a14="http://schemas.microsoft.com/office/drawing/2010/main" val="0"/>
+              </a:ext>
+            </a:extLst>
+          </a:blip>
+          <a:stretch>
+            <a:fillRect/>
+          </a:stretch>
+        </p:blipFill>
+        <p:spPr>
+          <a:xfrm>
+            <a:off x="24961850" y="17759442"/>
+            <a:ext cx="1339597" cy="914400"/>
+          </a:xfrm>
+          <a:prstGeom prst="rect">
+            <a:avLst/>
+          </a:prstGeom>
+        </p:spPr>
+      </p:pic>
+      <p:sp>
+        <p:nvSpPr>
+          <p:cNvPr id="99" name="TextBox 98"/>
+          <p:cNvSpPr txBox="1"/>
+          <p:nvPr/>
+        </p:nvSpPr>
+        <p:spPr>
+          <a:xfrm>
+            <a:off x="24307800" y="18032492"/>
+            <a:ext cx="609599" cy="369332"/>
+          </a:xfrm>
+          <a:prstGeom prst="rect">
+            <a:avLst/>
+          </a:prstGeom>
+          <a:noFill/>
+        </p:spPr>
+        <p:txBody>
+          <a:bodyPr wrap="square" rtlCol="0">
+            <a:spAutoFit/>
+          </a:bodyPr>
+          <a:lstStyle/>
+          <a:p>
+            <a:pPr algn="r"/>
+            <a:r>
+              <a:rPr lang="en-US" sz="1800" dirty="0" smtClean="0">
+                <a:solidFill>
+                  <a:schemeClr val="bg2"/>
+                </a:solidFill>
+              </a:rPr>
+              <a:t>(2)</a:t>
+            </a:r>
+            <a:endParaRPr lang="en-US" sz="1800" dirty="0">
+              <a:solidFill>
+                <a:schemeClr val="bg2"/>
+              </a:solidFill>
+            </a:endParaRPr>
+          </a:p>
+        </p:txBody>
+      </p:sp>
+      <p:graphicFrame>
+        <p:nvGraphicFramePr>
+          <p:cNvPr id="100" name="Table 99"/>
+          <p:cNvGraphicFramePr>
+            <a:graphicFrameLocks noGrp="1"/>
+          </p:cNvGraphicFramePr>
+          <p:nvPr>
+            <p:extLst>
+              <p:ext uri="{D42A27DB-BD31-4B8C-83A1-F6EECF244321}">
+                <p14:modId xmlns:p14="http://schemas.microsoft.com/office/powerpoint/2010/main" val="3484687974"/>
+              </p:ext>
+            </p:extLst>
+          </p:nvPr>
+        </p:nvGraphicFramePr>
+        <p:xfrm>
+          <a:off x="26670000" y="17817216"/>
+          <a:ext cx="8763000" cy="701040"/>
+        </p:xfrm>
+        <a:graphic>
+          <a:graphicData uri="http://schemas.openxmlformats.org/drawingml/2006/table">
+            <a:tbl>
+              <a:tblPr firstRow="1" bandRow="1">
+                <a:tableStyleId>{2D5ABB26-0587-4C30-8999-92F81FD0307C}</a:tableStyleId>
+              </a:tblPr>
+              <a:tblGrid>
+                <a:gridCol w="4381500"/>
+                <a:gridCol w="4381500"/>
+              </a:tblGrid>
+              <a:tr h="370840">
+                <a:tc>
+                  <a:txBody>
+                    <a:bodyPr/>
+                    <a:lstStyle/>
+                    <a:p>
+                      <a:pPr algn="ctr"/>
+                      <a:r>
+                        <a:rPr lang="en-US" sz="4000" b="0" u="none" dirty="0" smtClean="0">
+                          <a:latin typeface="Helvetica"/>
+                          <a:cs typeface="Helvetica"/>
+                        </a:rPr>
+                        <a:t>44%</a:t>
+                      </a:r>
+                      <a:endParaRPr lang="en-US" sz="4000" b="0" u="none" dirty="0">
+                        <a:latin typeface="Helvetica"/>
+                        <a:cs typeface="Helvetica"/>
+                      </a:endParaRPr>
+                    </a:p>
+                  </a:txBody>
+                  <a:tcPr/>
+                </a:tc>
+                <a:tc>
+                  <a:txBody>
+                    <a:bodyPr/>
+                    <a:lstStyle/>
+                    <a:p>
+                      <a:pPr marL="0" marR="0" indent="0" algn="ctr" defTabSz="914400" rtl="0" eaLnBrk="1" fontAlgn="auto" latinLnBrk="0" hangingPunct="1">
+                        <a:lnSpc>
+                          <a:spcPct val="100000"/>
+                        </a:lnSpc>
+                        <a:spcBef>
+                          <a:spcPts val="0"/>
+                        </a:spcBef>
+                        <a:spcAft>
+                          <a:spcPts val="0"/>
+                        </a:spcAft>
+                        <a:buClrTx/>
+                        <a:buSzTx/>
+                        <a:buFontTx/>
+                        <a:buNone/>
+                        <a:tabLst/>
+                        <a:defRPr/>
+                      </a:pPr>
+                      <a:r>
+                        <a:rPr lang="en-US" sz="4000" b="0" u="none" dirty="0" smtClean="0">
+                          <a:latin typeface="Helvetica"/>
+                          <a:cs typeface="Helvetica"/>
+                        </a:rPr>
+                        <a:t>1.3%</a:t>
+                      </a:r>
+                    </a:p>
+                  </a:txBody>
+                  <a:tcPr/>
+                </a:tc>
+              </a:tr>
+            </a:tbl>
+          </a:graphicData>
+        </a:graphic>
+      </p:graphicFrame>
+      <p:sp>
+        <p:nvSpPr>
+          <p:cNvPr id="104" name="TextBox 103"/>
+          <p:cNvSpPr txBox="1"/>
+          <p:nvPr/>
+        </p:nvSpPr>
+        <p:spPr>
+          <a:xfrm>
+            <a:off x="24307800" y="18927266"/>
+            <a:ext cx="11734800" cy="584776"/>
+          </a:xfrm>
+          <a:prstGeom prst="rect">
+            <a:avLst/>
+          </a:prstGeom>
+          <a:noFill/>
+        </p:spPr>
+        <p:txBody>
+          <a:bodyPr wrap="square" rtlCol="0">
+            <a:spAutoFit/>
+          </a:bodyPr>
+          <a:lstStyle/>
+          <a:p>
+            <a:r>
+              <a:rPr lang="en-US" sz="3200" dirty="0" smtClean="0">
+                <a:latin typeface="Cambria"/>
+                <a:cs typeface="Cambria"/>
+              </a:rPr>
+              <a:t>…and losers:</a:t>
+            </a:r>
+          </a:p>
+        </p:txBody>
+      </p:sp>
+      <p:sp>
+        <p:nvSpPr>
+          <p:cNvPr id="105" name="TextBox 104"/>
+          <p:cNvSpPr txBox="1"/>
+          <p:nvPr/>
+        </p:nvSpPr>
+        <p:spPr>
+          <a:xfrm>
+            <a:off x="24307800" y="19993608"/>
+            <a:ext cx="609599" cy="369332"/>
+          </a:xfrm>
+          <a:prstGeom prst="rect">
+            <a:avLst/>
+          </a:prstGeom>
+          <a:noFill/>
+        </p:spPr>
+        <p:txBody>
+          <a:bodyPr wrap="square" rtlCol="0">
+            <a:spAutoFit/>
+          </a:bodyPr>
+          <a:lstStyle/>
+          <a:p>
+            <a:pPr algn="r"/>
+            <a:r>
+              <a:rPr lang="en-US" sz="1800" dirty="0" smtClean="0">
+                <a:solidFill>
+                  <a:schemeClr val="bg2"/>
+                </a:solidFill>
+              </a:rPr>
+              <a:t>(13)</a:t>
+            </a:r>
+            <a:endParaRPr lang="en-US" sz="1800" dirty="0">
+              <a:solidFill>
+                <a:schemeClr val="bg2"/>
+              </a:solidFill>
+            </a:endParaRPr>
+          </a:p>
+        </p:txBody>
+      </p:sp>
+      <p:graphicFrame>
+        <p:nvGraphicFramePr>
+          <p:cNvPr id="106" name="Table 105"/>
+          <p:cNvGraphicFramePr>
+            <a:graphicFrameLocks noGrp="1"/>
+          </p:cNvGraphicFramePr>
+          <p:nvPr>
+            <p:extLst>
+              <p:ext uri="{D42A27DB-BD31-4B8C-83A1-F6EECF244321}">
+                <p14:modId xmlns:p14="http://schemas.microsoft.com/office/powerpoint/2010/main" val="2619962297"/>
+              </p:ext>
+            </p:extLst>
+          </p:nvPr>
+        </p:nvGraphicFramePr>
+        <p:xfrm>
+          <a:off x="26289000" y="19827000"/>
+          <a:ext cx="9753600" cy="701040"/>
+        </p:xfrm>
+        <a:graphic>
+          <a:graphicData uri="http://schemas.openxmlformats.org/drawingml/2006/table">
+            <a:tbl>
+              <a:tblPr firstRow="1" bandRow="1">
+                <a:tableStyleId>{2D5ABB26-0587-4C30-8999-92F81FD0307C}</a:tableStyleId>
+              </a:tblPr>
+              <a:tblGrid>
+                <a:gridCol w="4876800"/>
+                <a:gridCol w="4876800"/>
+              </a:tblGrid>
+              <a:tr h="370840">
+                <a:tc>
+                  <a:txBody>
+                    <a:bodyPr/>
+                    <a:lstStyle/>
+                    <a:p>
+                      <a:pPr algn="ctr"/>
+                      <a:r>
+                        <a:rPr lang="en-US" sz="4000" b="0" u="none" dirty="0" smtClean="0">
+                          <a:latin typeface="Helvetica"/>
+                          <a:cs typeface="Helvetica"/>
+                        </a:rPr>
+                        <a:t>0%</a:t>
+                      </a:r>
+                      <a:endParaRPr lang="en-US" sz="4000" b="0" u="none" dirty="0">
+                        <a:latin typeface="Helvetica"/>
+                        <a:cs typeface="Helvetica"/>
+                      </a:endParaRPr>
+                    </a:p>
+                  </a:txBody>
+                  <a:tcPr/>
+                </a:tc>
+                <a:tc>
+                  <a:txBody>
+                    <a:bodyPr/>
+                    <a:lstStyle/>
+                    <a:p>
+                      <a:pPr marL="0" marR="0" indent="0" algn="ctr" defTabSz="914400" rtl="0" eaLnBrk="1" fontAlgn="auto" latinLnBrk="0" hangingPunct="1">
+                        <a:lnSpc>
+                          <a:spcPct val="100000"/>
+                        </a:lnSpc>
+                        <a:spcBef>
+                          <a:spcPts val="0"/>
+                        </a:spcBef>
+                        <a:spcAft>
+                          <a:spcPts val="0"/>
+                        </a:spcAft>
+                        <a:buClrTx/>
+                        <a:buSzTx/>
+                        <a:buFontTx/>
+                        <a:buNone/>
+                        <a:tabLst/>
+                        <a:defRPr/>
+                      </a:pPr>
+                      <a:r>
+                        <a:rPr lang="en-US" sz="4000" b="0" u="none" dirty="0" smtClean="0">
+                          <a:latin typeface="Helvetica"/>
+                          <a:cs typeface="Helvetica"/>
+                        </a:rPr>
+                        <a:t>0%</a:t>
+                      </a:r>
+                    </a:p>
+                  </a:txBody>
+                  <a:tcPr/>
+                </a:tc>
+              </a:tr>
+            </a:tbl>
+          </a:graphicData>
+        </a:graphic>
+      </p:graphicFrame>
     </p:spTree>
   </p:cSld>
   <p:clrMapOvr>
@@ -7313,7 +8312,7 @@
   <p:timing>
     <p:tnLst>
       <p:par>
-        <p:cTn id="1" dur="indefinite" restart="never" nodeType="tmRoot"/>
+        <p:cTn xmlns:p14="http://schemas.microsoft.com/office/powerpoint/2010/main" id="1" dur="indefinite" restart="never" nodeType="tmRoot"/>
       </p:par>
     </p:tnLst>
   </p:timing>

</xml_diff>

<commit_message>
Added more notes on data, results
</commit_message>
<xml_diff>
--- a/poster/poster-master.pptx
+++ b/poster/poster-master.pptx
@@ -139,7 +139,7 @@
   </p:defaultTextStyle>
   <p:extLst>
     <p:ext uri="{EFAFB233-063F-42B5-8137-9DF3F51BA10A}">
-      <p15:sldGuideLst xmlns="" xmlns:p15="http://schemas.microsoft.com/office/powerpoint/2012/main">
+      <p15:sldGuideLst xmlns:p15="http://schemas.microsoft.com/office/powerpoint/2012/main" xmlns="">
         <p15:guide id="1" orient="horz" pos="9216">
           <p15:clr>
             <a:srgbClr val="A4A3A4"/>
@@ -4625,7 +4625,7 @@
         </p:nvSpPr>
         <p:spPr>
           <a:xfrm>
-            <a:off x="12344400" y="15621000"/>
+            <a:off x="12344400" y="15657255"/>
             <a:ext cx="11887200" cy="841248"/>
           </a:xfrm>
           <a:prstGeom prst="rect">
@@ -4680,7 +4680,7 @@
         </p:nvSpPr>
         <p:spPr>
           <a:xfrm>
-            <a:off x="12344400" y="15621000"/>
+            <a:off x="12344400" y="15657255"/>
             <a:ext cx="11887200" cy="769441"/>
           </a:xfrm>
           <a:prstGeom prst="rect">
@@ -4723,8 +4723,8 @@
         </p:nvSpPr>
         <p:spPr>
           <a:xfrm>
-            <a:off x="533400" y="12954000"/>
-            <a:ext cx="11734800" cy="1569660"/>
+            <a:off x="533400" y="12990255"/>
+            <a:ext cx="11734800" cy="2554545"/>
           </a:xfrm>
           <a:prstGeom prst="rect">
             <a:avLst/>
@@ -4798,8 +4798,19 @@
                 <a:latin typeface="Cambria"/>
                 <a:cs typeface="Cambria"/>
               </a:rPr>
-              <a:t> to retrieve and extract game data.</a:t>
-            </a:r>
+              <a:t> to retrieve and extract game data</a:t>
+            </a:r>
+            <a:r>
+              <a:rPr lang="en-US" sz="3200" dirty="0" smtClean="0">
+                <a:latin typeface="Cambria"/>
+                <a:cs typeface="Cambria"/>
+              </a:rPr>
+              <a:t>. Before model fitting, we calculated differences of team features between opponents to quantify their relative (not absolute) attributes.</a:t>
+            </a:r>
+            <a:endParaRPr lang="en-US" sz="3200" dirty="0" smtClean="0">
+              <a:latin typeface="Cambria"/>
+              <a:cs typeface="Cambria"/>
+            </a:endParaRPr>
           </a:p>
         </p:txBody>
       </p:sp>
@@ -4811,7 +4822,7 @@
         </p:nvSpPr>
         <p:spPr>
           <a:xfrm>
-            <a:off x="533400" y="4495800"/>
+            <a:off x="533400" y="4572000"/>
             <a:ext cx="11734800" cy="6001642"/>
           </a:xfrm>
           <a:prstGeom prst="rect">
@@ -4902,7 +4913,7 @@
         </p:blipFill>
         <p:spPr>
           <a:xfrm>
-            <a:off x="8763000" y="10515600"/>
+            <a:off x="8763000" y="10591800"/>
             <a:ext cx="1028700" cy="1371600"/>
           </a:xfrm>
           <a:prstGeom prst="rect">
@@ -4926,7 +4937,7 @@
         </p:blipFill>
         <p:spPr>
           <a:xfrm>
-            <a:off x="2971800" y="10515600"/>
+            <a:off x="2971800" y="10591800"/>
             <a:ext cx="1096205" cy="1371600"/>
           </a:xfrm>
           <a:prstGeom prst="rect">
@@ -4950,7 +4961,7 @@
         </p:blipFill>
         <p:spPr>
           <a:xfrm>
-            <a:off x="4765573" y="10744200"/>
+            <a:off x="4765573" y="10820400"/>
             <a:ext cx="3270455" cy="914400"/>
           </a:xfrm>
           <a:prstGeom prst="rect">
@@ -4966,7 +4977,7 @@
         </p:nvSpPr>
         <p:spPr>
           <a:xfrm>
-            <a:off x="24307800" y="4495800"/>
+            <a:off x="24307800" y="4532799"/>
             <a:ext cx="11734800" cy="2477601"/>
           </a:xfrm>
           <a:prstGeom prst="rect">
@@ -5084,13 +5095,13 @@
           <p:nvPr>
             <p:extLst>
               <p:ext uri="{D42A27DB-BD31-4B8C-83A1-F6EECF244321}">
-                <p14:modId xmlns:p14="http://schemas.microsoft.com/office/powerpoint/2010/main" val="3274951746"/>
+                <p14:modId xmlns:p14="http://schemas.microsoft.com/office/powerpoint/2010/main" val="2293738623"/>
               </p:ext>
             </p:extLst>
           </p:nvPr>
         </p:nvGraphicFramePr>
         <p:xfrm>
-          <a:off x="533400" y="14767560"/>
+          <a:off x="533400" y="15773400"/>
           <a:ext cx="11734800" cy="1524000"/>
         </p:xfrm>
         <a:graphic>
@@ -5180,7 +5191,14 @@
                           <a:latin typeface="Cambria"/>
                           <a:cs typeface="Cambria"/>
                         </a:rPr>
-                        <a:t>33,000 from 2010-Present</a:t>
+                        <a:t>33,000 </a:t>
+                      </a:r>
+                      <a:r>
+                        <a:rPr lang="en-US" sz="4400" dirty="0" smtClean="0">
+                          <a:latin typeface="Cambria"/>
+                          <a:cs typeface="Cambria"/>
+                        </a:rPr>
+                        <a:t>(2010-2015)</a:t>
                       </a:r>
                       <a:endParaRPr lang="en-US" sz="4400" dirty="0">
                         <a:latin typeface="Cambria"/>
@@ -5203,8 +5221,8 @@
         </p:nvSpPr>
         <p:spPr>
           <a:xfrm>
-            <a:off x="533400" y="16711841"/>
-            <a:ext cx="11734800" cy="2739211"/>
+            <a:off x="533400" y="17565281"/>
+            <a:ext cx="11734800" cy="2477601"/>
           </a:xfrm>
           <a:prstGeom prst="rect">
             <a:avLst/>
@@ -5230,7 +5248,7 @@
             </a:endParaRPr>
           </a:p>
           <a:p>
-            <a:endParaRPr lang="en-US" sz="3200" dirty="0" smtClean="0">
+            <a:endParaRPr lang="en-US" sz="1500" dirty="0" smtClean="0">
               <a:latin typeface="Cambria"/>
               <a:cs typeface="Cambria"/>
             </a:endParaRPr>
@@ -5241,7 +5259,21 @@
                 <a:latin typeface="Cambria"/>
                 <a:cs typeface="Cambria"/>
               </a:rPr>
-              <a:t>Ken Pomeroy produces basketball statistics adjusted for team possessions and game tempo. We used several of his statistics as features in our own models:</a:t>
+              <a:t>Ken Pomeroy produces basketball statistics adjusted for team possessions and game tempo. We used several of his statistics </a:t>
+            </a:r>
+            <a:r>
+              <a:rPr lang="en-US" sz="3200" dirty="0" smtClean="0">
+                <a:latin typeface="Cambria"/>
+                <a:cs typeface="Cambria"/>
+              </a:rPr>
+              <a:t>and ideas as </a:t>
+            </a:r>
+            <a:r>
+              <a:rPr lang="en-US" sz="3200" dirty="0" smtClean="0">
+                <a:latin typeface="Cambria"/>
+                <a:cs typeface="Cambria"/>
+              </a:rPr>
+              <a:t>features in our own models:</a:t>
             </a:r>
           </a:p>
         </p:txBody>
@@ -5255,14 +5287,14 @@
           <p:nvPr>
             <p:extLst>
               <p:ext uri="{D42A27DB-BD31-4B8C-83A1-F6EECF244321}">
-                <p14:modId xmlns:p14="http://schemas.microsoft.com/office/powerpoint/2010/main" val="4212558244"/>
+                <p14:modId xmlns:p14="http://schemas.microsoft.com/office/powerpoint/2010/main" val="1592791794"/>
               </p:ext>
             </p:extLst>
           </p:nvPr>
         </p:nvGraphicFramePr>
         <p:xfrm>
-          <a:off x="533400" y="19598640"/>
-          <a:ext cx="11734800" cy="5699760"/>
+          <a:off x="609600" y="20452080"/>
+          <a:ext cx="11658600" cy="5821680"/>
         </p:xfrm>
         <a:graphic>
           <a:graphicData uri="http://schemas.openxmlformats.org/drawingml/2006/table">
@@ -5271,8 +5303,8 @@
                 <a:tableStyleId>{2D5ABB26-0587-4C30-8999-92F81FD0307C}</a:tableStyleId>
               </a:tblPr>
               <a:tblGrid>
-                <a:gridCol w="2895600"/>
-                <a:gridCol w="8839200"/>
+                <a:gridCol w="3581400"/>
+                <a:gridCol w="8077200"/>
               </a:tblGrid>
               <a:tr h="370840">
                 <a:tc>
@@ -5286,7 +5318,7 @@
                           <a:latin typeface="Cambria"/>
                           <a:cs typeface="Cambria"/>
                         </a:rPr>
-                        <a:t>Feature</a:t>
+                        <a:t>Feature/Concept</a:t>
                       </a:r>
                       <a:endParaRPr lang="en-US" sz="3200" b="1" u="sng" dirty="0">
                         <a:latin typeface="Cambria"/>
@@ -5326,15 +5358,15 @@
                     <a:p>
                       <a:pPr algn="r"/>
                       <a:r>
-                        <a:rPr lang="en-US" sz="3200" dirty="0" err="1" smtClean="0">
-                          <a:latin typeface="Consolas"/>
-                          <a:cs typeface="Consolas"/>
+                        <a:rPr lang="en-US" sz="3200" dirty="0" smtClean="0">
+                          <a:latin typeface="Cambria"/>
+                          <a:cs typeface="Cambria"/>
                         </a:rPr>
-                        <a:t>Pythag</a:t>
+                        <a:t>Location</a:t>
                       </a:r>
                       <a:endParaRPr lang="en-US" sz="3200" dirty="0">
-                        <a:latin typeface="Consolas"/>
-                        <a:cs typeface="Consolas"/>
+                        <a:latin typeface="Cambria"/>
+                        <a:cs typeface="Cambria"/>
                       </a:endParaRPr>
                     </a:p>
                   </a:txBody>
@@ -5351,14 +5383,65 @@
                           <a:latin typeface="Cambria"/>
                           <a:cs typeface="Cambria"/>
                         </a:rPr>
-                        <a:t>A simple weighting of offensive and defensive efficiency compared to division 1 team averages</a:t>
+                        <a:t>Our analysis</a:t>
                       </a:r>
                       <a:r>
                         <a:rPr lang="en-US" sz="3200" baseline="0" dirty="0" smtClean="0">
                           <a:latin typeface="Cambria"/>
                           <a:cs typeface="Cambria"/>
                         </a:rPr>
-                        <a:t>.</a:t>
+                        <a:t> explores the well-known concept of home-court advantage.</a:t>
+                      </a:r>
+                      <a:endParaRPr lang="en-US" sz="3200" dirty="0">
+                        <a:latin typeface="Cambria"/>
+                        <a:cs typeface="Cambria"/>
+                      </a:endParaRPr>
+                    </a:p>
+                  </a:txBody>
+                  <a:tcPr marL="274320"/>
+                </a:tc>
+              </a:tr>
+              <a:tr h="370840">
+                <a:tc>
+                  <a:txBody>
+                    <a:bodyPr/>
+                    <a:lstStyle/>
+                    <a:p>
+                      <a:pPr algn="r"/>
+                      <a:r>
+                        <a:rPr lang="en-US" sz="3200" baseline="0" dirty="0" smtClean="0">
+                          <a:latin typeface="Cambria"/>
+                          <a:cs typeface="Cambria"/>
+                        </a:rPr>
+                        <a:t>Efficiency</a:t>
+                      </a:r>
+                      <a:endParaRPr lang="en-US" sz="3200" dirty="0">
+                        <a:latin typeface="Cambria"/>
+                        <a:cs typeface="Cambria"/>
+                      </a:endParaRPr>
+                    </a:p>
+                  </a:txBody>
+                  <a:tcPr marR="274320"/>
+                </a:tc>
+                <a:tc>
+                  <a:txBody>
+                    <a:bodyPr/>
+                    <a:lstStyle/>
+                    <a:p>
+                      <a:pPr algn="l"/>
+                      <a:r>
+                        <a:rPr lang="en-US" sz="3200" dirty="0" smtClean="0">
+                          <a:latin typeface="Cambria"/>
+                          <a:cs typeface="Cambria"/>
+                        </a:rPr>
+                        <a:t>Offensive/defensive (OE/DE)</a:t>
+                      </a:r>
+                      <a:r>
+                        <a:rPr lang="en-US" sz="3200" baseline="0" dirty="0" smtClean="0">
+                          <a:latin typeface="Cambria"/>
+                          <a:cs typeface="Cambria"/>
+                        </a:rPr>
+                        <a:t> efficiency weights points scored by game possessions.</a:t>
                       </a:r>
                       <a:endParaRPr lang="en-US" sz="3200" dirty="0">
                         <a:latin typeface="Cambria"/>
@@ -5378,14 +5461,14 @@
                       <a:pPr algn="r"/>
                       <a:r>
                         <a:rPr lang="en-US" sz="3200" dirty="0" smtClean="0">
-                          <a:latin typeface="Consolas"/>
-                          <a:cs typeface="Consolas"/>
+                          <a:latin typeface="Cambria"/>
+                          <a:cs typeface="Cambria"/>
                         </a:rPr>
-                        <a:t>TODO</a:t>
+                        <a:t>Tempo</a:t>
                       </a:r>
                       <a:endParaRPr lang="en-US" sz="3200" dirty="0">
-                        <a:latin typeface="Consolas"/>
-                        <a:cs typeface="Consolas"/>
+                        <a:latin typeface="Cambria"/>
+                        <a:cs typeface="Cambria"/>
                       </a:endParaRPr>
                     </a:p>
                   </a:txBody>
@@ -5402,7 +5485,14 @@
                           <a:latin typeface="Cambria"/>
                           <a:cs typeface="Cambria"/>
                         </a:rPr>
-                        <a:t>TODO</a:t>
+                        <a:t>A measurement of game speed based on possessions. Useful</a:t>
+                      </a:r>
+                      <a:r>
+                        <a:rPr lang="en-US" sz="3200" baseline="0" dirty="0" smtClean="0">
+                          <a:latin typeface="Cambria"/>
+                          <a:cs typeface="Cambria"/>
+                        </a:rPr>
+                        <a:t> for comparing quick teams to slower, methodical ones.</a:t>
                       </a:r>
                       <a:endParaRPr lang="en-US" sz="3200" dirty="0">
                         <a:latin typeface="Cambria"/>
@@ -5420,9 +5510,23 @@
                     <a:lstStyle/>
                     <a:p>
                       <a:pPr algn="r"/>
+                      <a:r>
+                        <a:rPr lang="en-US" sz="3200" dirty="0" smtClean="0">
+                          <a:latin typeface="Cambria"/>
+                          <a:cs typeface="Cambria"/>
+                        </a:rPr>
+                        <a:t>Pythagorean</a:t>
+                      </a:r>
+                      <a:r>
+                        <a:rPr lang="en-US" sz="3200" baseline="0" dirty="0" smtClean="0">
+                          <a:latin typeface="Cambria"/>
+                          <a:cs typeface="Cambria"/>
+                        </a:rPr>
+                        <a:t> Percentage</a:t>
+                      </a:r>
                       <a:endParaRPr lang="en-US" sz="3200" dirty="0">
-                        <a:latin typeface="Consolas"/>
-                        <a:cs typeface="Consolas"/>
+                        <a:latin typeface="Cambria"/>
+                        <a:cs typeface="Cambria"/>
                       </a:endParaRPr>
                     </a:p>
                   </a:txBody>
@@ -5439,158 +5543,29 @@
                           <a:latin typeface="Cambria"/>
                           <a:cs typeface="Cambria"/>
                         </a:rPr>
-                        <a:t>…etc.</a:t>
+                        <a:t>Single-feature</a:t>
                       </a:r>
-                      <a:endParaRPr lang="en-US" sz="3200" dirty="0">
-                        <a:latin typeface="Cambria"/>
-                        <a:cs typeface="Cambria"/>
-                      </a:endParaRPr>
-                    </a:p>
-                  </a:txBody>
-                  <a:tcPr marL="274320"/>
-                </a:tc>
-              </a:tr>
-              <a:tr h="370840">
-                <a:tc>
-                  <a:txBody>
-                    <a:bodyPr/>
-                    <a:lstStyle/>
-                    <a:p>
-                      <a:pPr algn="r"/>
-                      <a:endParaRPr lang="en-US" sz="3200" dirty="0">
-                        <a:latin typeface="Consolas"/>
-                        <a:cs typeface="Consolas"/>
-                      </a:endParaRPr>
-                    </a:p>
-                  </a:txBody>
-                  <a:tcPr marR="274320"/>
-                </a:tc>
-                <a:tc>
-                  <a:txBody>
-                    <a:bodyPr/>
-                    <a:lstStyle/>
-                    <a:p>
-                      <a:pPr algn="l"/>
-                      <a:endParaRPr lang="en-US" sz="3200" dirty="0">
-                        <a:latin typeface="Cambria"/>
-                        <a:cs typeface="Cambria"/>
-                      </a:endParaRPr>
-                    </a:p>
-                  </a:txBody>
-                  <a:tcPr marL="274320"/>
-                </a:tc>
-              </a:tr>
-              <a:tr h="370840">
-                <a:tc>
-                  <a:txBody>
-                    <a:bodyPr/>
-                    <a:lstStyle/>
-                    <a:p>
-                      <a:pPr algn="r"/>
-                      <a:endParaRPr lang="en-US" sz="3200" dirty="0">
-                        <a:latin typeface="Consolas"/>
-                        <a:cs typeface="Consolas"/>
-                      </a:endParaRPr>
-                    </a:p>
-                  </a:txBody>
-                  <a:tcPr marR="274320"/>
-                </a:tc>
-                <a:tc>
-                  <a:txBody>
-                    <a:bodyPr/>
-                    <a:lstStyle/>
-                    <a:p>
-                      <a:pPr algn="l"/>
-                      <a:endParaRPr lang="en-US" sz="3200" dirty="0">
-                        <a:latin typeface="Cambria"/>
-                        <a:cs typeface="Cambria"/>
-                      </a:endParaRPr>
-                    </a:p>
-                  </a:txBody>
-                  <a:tcPr marL="274320"/>
-                </a:tc>
-              </a:tr>
-              <a:tr h="370840">
-                <a:tc>
-                  <a:txBody>
-                    <a:bodyPr/>
-                    <a:lstStyle/>
-                    <a:p>
-                      <a:pPr algn="r"/>
-                      <a:endParaRPr lang="en-US" sz="3200" dirty="0">
-                        <a:latin typeface="Consolas"/>
-                        <a:cs typeface="Consolas"/>
-                      </a:endParaRPr>
-                    </a:p>
-                  </a:txBody>
-                  <a:tcPr marR="274320"/>
-                </a:tc>
-                <a:tc>
-                  <a:txBody>
-                    <a:bodyPr/>
-                    <a:lstStyle/>
-                    <a:p>
-                      <a:pPr algn="l"/>
-                      <a:endParaRPr lang="en-US" sz="3200" dirty="0">
-                        <a:latin typeface="Cambria"/>
-                        <a:cs typeface="Cambria"/>
-                      </a:endParaRPr>
-                    </a:p>
-                  </a:txBody>
-                  <a:tcPr marL="274320"/>
-                </a:tc>
-              </a:tr>
-              <a:tr h="370840">
-                <a:tc>
-                  <a:txBody>
-                    <a:bodyPr/>
-                    <a:lstStyle/>
-                    <a:p>
-                      <a:pPr algn="r"/>
-                      <a:endParaRPr lang="en-US" sz="3200" dirty="0">
-                        <a:latin typeface="Consolas"/>
-                        <a:cs typeface="Consolas"/>
-                      </a:endParaRPr>
-                    </a:p>
-                  </a:txBody>
-                  <a:tcPr marR="274320"/>
-                </a:tc>
-                <a:tc>
-                  <a:txBody>
-                    <a:bodyPr/>
-                    <a:lstStyle/>
-                    <a:p>
-                      <a:pPr algn="l"/>
-                      <a:endParaRPr lang="en-US" sz="3200" dirty="0">
-                        <a:latin typeface="Cambria"/>
-                        <a:cs typeface="Cambria"/>
-                      </a:endParaRPr>
-                    </a:p>
-                  </a:txBody>
-                  <a:tcPr marL="274320"/>
-                </a:tc>
-              </a:tr>
-              <a:tr h="370840">
-                <a:tc>
-                  <a:txBody>
-                    <a:bodyPr/>
-                    <a:lstStyle/>
-                    <a:p>
-                      <a:pPr algn="r"/>
-                      <a:endParaRPr lang="en-US" sz="3200" dirty="0">
-                        <a:latin typeface="Consolas"/>
-                        <a:cs typeface="Consolas"/>
-                      </a:endParaRPr>
-                    </a:p>
-                  </a:txBody>
-                  <a:tcPr marR="274320"/>
-                </a:tc>
-                <a:tc>
-                  <a:txBody>
-                    <a:bodyPr/>
-                    <a:lstStyle/>
-                    <a:p>
-                      <a:pPr algn="l"/>
+                      <a:r>
+                        <a:rPr lang="en-US" sz="3200" baseline="0" dirty="0" smtClean="0">
+                          <a:latin typeface="Cambria"/>
+                          <a:cs typeface="Cambria"/>
+                        </a:rPr>
+                        <a:t> </a:t>
+                      </a:r>
+                      <a:r>
+                        <a:rPr lang="en-US" sz="3200" dirty="0" smtClean="0">
+                          <a:latin typeface="Cambria"/>
+                          <a:cs typeface="Cambria"/>
+                        </a:rPr>
+                        <a:t>weighting of offensive</a:t>
+                      </a:r>
+                      <a:r>
+                        <a:rPr lang="en-US" sz="3200" baseline="0" dirty="0" smtClean="0">
+                          <a:latin typeface="Cambria"/>
+                          <a:cs typeface="Cambria"/>
+                        </a:rPr>
+                        <a:t> and defensive efficiency; helps us measure their joint importance.</a:t>
+                      </a:r>
                       <a:endParaRPr lang="en-US" sz="3200" dirty="0">
                         <a:latin typeface="Cambria"/>
                         <a:cs typeface="Cambria"/>
@@ -6317,60 +6292,13 @@
       </p:graphicFrame>
       <p:sp>
         <p:nvSpPr>
-          <p:cNvPr id="130" name="TextBox 129"/>
-          <p:cNvSpPr txBox="1"/>
-          <p:nvPr/>
-        </p:nvSpPr>
-        <p:spPr>
-          <a:xfrm>
-            <a:off x="24307800" y="7391400"/>
-            <a:ext cx="11734800" cy="1492716"/>
-          </a:xfrm>
-          <a:prstGeom prst="rect">
-            <a:avLst/>
-          </a:prstGeom>
-          <a:noFill/>
-        </p:spPr>
-        <p:txBody>
-          <a:bodyPr wrap="square" rtlCol="0">
-            <a:spAutoFit/>
-          </a:bodyPr>
-          <a:lstStyle/>
-          <a:p>
-            <a:r>
-              <a:rPr lang="en-US" sz="4400" b="1" u="sng" dirty="0" smtClean="0">
-                <a:latin typeface="Cambria"/>
-                <a:cs typeface="Cambria"/>
-              </a:rPr>
-              <a:t>What Really Matters</a:t>
-            </a:r>
-          </a:p>
-          <a:p>
-            <a:endParaRPr lang="en-US" sz="1500" dirty="0">
-              <a:latin typeface="Cambria"/>
-              <a:cs typeface="Cambria"/>
-            </a:endParaRPr>
-          </a:p>
-          <a:p>
-            <a:r>
-              <a:rPr lang="en-US" sz="3200" dirty="0" smtClean="0">
-                <a:latin typeface="Cambria"/>
-                <a:cs typeface="Cambria"/>
-              </a:rPr>
-              <a:t>TODO FEATURE INTERPRETATION</a:t>
-            </a:r>
-          </a:p>
-        </p:txBody>
-      </p:sp>
-      <p:sp>
-        <p:nvSpPr>
           <p:cNvPr id="56" name="TextBox 55"/>
           <p:cNvSpPr txBox="1"/>
           <p:nvPr/>
         </p:nvSpPr>
         <p:spPr>
           <a:xfrm>
-            <a:off x="12420600" y="16687800"/>
+            <a:off x="12420600" y="16647855"/>
             <a:ext cx="11734800" cy="2554545"/>
           </a:xfrm>
           <a:prstGeom prst="rect">
@@ -7084,8 +7012,12 @@
                 <a:latin typeface="Cambria"/>
                 <a:cs typeface="Cambria"/>
               </a:rPr>
-              <a:t>Anyone’s Game</a:t>
-            </a:r>
+              <a:t>2015 NCAA Tournament</a:t>
+            </a:r>
+            <a:endParaRPr lang="en-US" sz="4400" b="1" u="sng" dirty="0" smtClean="0">
+              <a:latin typeface="Cambria"/>
+              <a:cs typeface="Cambria"/>
+            </a:endParaRPr>
           </a:p>
           <a:p>
             <a:endParaRPr lang="en-US" sz="1500" dirty="0">
@@ -7852,13 +7784,13 @@
           <p:nvPr>
             <p:extLst>
               <p:ext uri="{D42A27DB-BD31-4B8C-83A1-F6EECF244321}">
-                <p14:modId xmlns:p14="http://schemas.microsoft.com/office/powerpoint/2010/main" val="3133749223"/>
+                <p14:modId xmlns:p14="http://schemas.microsoft.com/office/powerpoint/2010/main" val="364762423"/>
               </p:ext>
             </p:extLst>
           </p:nvPr>
         </p:nvGraphicFramePr>
         <p:xfrm>
-          <a:off x="26670000" y="16787980"/>
+          <a:off x="26670000" y="16756231"/>
           <a:ext cx="8763000" cy="701040"/>
         </p:xfrm>
         <a:graphic>
@@ -8168,14 +8100,14 @@
           <p:nvPr>
             <p:extLst>
               <p:ext uri="{D42A27DB-BD31-4B8C-83A1-F6EECF244321}">
-                <p14:modId xmlns:p14="http://schemas.microsoft.com/office/powerpoint/2010/main" val="2619962297"/>
+                <p14:modId xmlns:p14="http://schemas.microsoft.com/office/powerpoint/2010/main" val="2926232118"/>
               </p:ext>
             </p:extLst>
           </p:nvPr>
         </p:nvGraphicFramePr>
         <p:xfrm>
-          <a:off x="26289000" y="19827000"/>
-          <a:ext cx="9753600" cy="701040"/>
+          <a:off x="26670000" y="19827000"/>
+          <a:ext cx="8763000" cy="701040"/>
         </p:xfrm>
         <a:graphic>
           <a:graphicData uri="http://schemas.openxmlformats.org/drawingml/2006/table">
@@ -8184,8 +8116,8 @@
                 <a:tableStyleId>{2D5ABB26-0587-4C30-8999-92F81FD0307C}</a:tableStyleId>
               </a:tblPr>
               <a:tblGrid>
-                <a:gridCol w="4876800"/>
-                <a:gridCol w="4876800"/>
+                <a:gridCol w="4381500"/>
+                <a:gridCol w="4381500"/>
               </a:tblGrid>
               <a:tr h="370840">
                 <a:tc>
@@ -8255,7 +8187,7 @@
         </p:nvSpPr>
         <p:spPr>
           <a:xfrm>
-            <a:off x="12420600" y="4495800"/>
+            <a:off x="12420600" y="4532055"/>
             <a:ext cx="11734800" cy="2554545"/>
           </a:xfrm>
           <a:prstGeom prst="rect">
@@ -8340,7 +8272,7 @@
         </p:nvGrpSpPr>
         <p:grpSpPr>
           <a:xfrm>
-            <a:off x="12725400" y="7086600"/>
+            <a:off x="12725400" y="7122855"/>
             <a:ext cx="11125199" cy="3658464"/>
             <a:chOff x="12420600" y="19887336"/>
             <a:chExt cx="11125199" cy="3658464"/>
@@ -8415,7 +8347,7 @@
         </p:nvSpPr>
         <p:spPr>
           <a:xfrm>
-            <a:off x="12420600" y="10972800"/>
+            <a:off x="12420600" y="11009055"/>
             <a:ext cx="11734800" cy="4524315"/>
           </a:xfrm>
           <a:prstGeom prst="rect">
@@ -8479,6 +8411,222 @@
               <a:t> = 5. Therefore, we included the 5 most important features from the random forest as our predictors. As for priors, we fitted a logistic regression on 2014 data and assigned the coefficient estimates as the prior means and used uninformative prior standard deviations at 10.</a:t>
             </a:r>
             <a:endParaRPr lang="en-US" sz="3200" dirty="0">
+              <a:latin typeface="Cambria"/>
+              <a:cs typeface="Cambria"/>
+            </a:endParaRPr>
+          </a:p>
+        </p:txBody>
+      </p:sp>
+      <p:sp>
+        <p:nvSpPr>
+          <p:cNvPr id="110" name="TextBox 109"/>
+          <p:cNvSpPr txBox="1"/>
+          <p:nvPr/>
+        </p:nvSpPr>
+        <p:spPr>
+          <a:xfrm>
+            <a:off x="24307800" y="7391400"/>
+            <a:ext cx="11734800" cy="2970044"/>
+          </a:xfrm>
+          <a:prstGeom prst="rect">
+            <a:avLst/>
+          </a:prstGeom>
+          <a:noFill/>
+        </p:spPr>
+        <p:txBody>
+          <a:bodyPr wrap="square" rtlCol="0">
+            <a:spAutoFit/>
+          </a:bodyPr>
+          <a:lstStyle/>
+          <a:p>
+            <a:r>
+              <a:rPr lang="en-US" sz="4400" b="1" u="sng" dirty="0" smtClean="0">
+                <a:latin typeface="Cambria"/>
+                <a:cs typeface="Cambria"/>
+              </a:rPr>
+              <a:t>What Really Matters</a:t>
+            </a:r>
+          </a:p>
+          <a:p>
+            <a:endParaRPr lang="en-US" sz="1500" dirty="0">
+              <a:latin typeface="Cambria"/>
+              <a:cs typeface="Cambria"/>
+            </a:endParaRPr>
+          </a:p>
+          <a:p>
+            <a:r>
+              <a:rPr lang="en-US" sz="3200" dirty="0" smtClean="0">
+                <a:latin typeface="Cambria"/>
+                <a:cs typeface="Cambria"/>
+              </a:rPr>
+              <a:t>Our model suggests </a:t>
+            </a:r>
+            <a:r>
+              <a:rPr lang="en-US" sz="3200" dirty="0" smtClean="0">
+                <a:latin typeface="Cambria"/>
+                <a:cs typeface="Cambria"/>
+              </a:rPr>
+              <a:t>the existence of a </a:t>
+            </a:r>
+            <a:r>
+              <a:rPr lang="en-US" sz="3200" dirty="0" smtClean="0">
+                <a:latin typeface="Cambria"/>
+                <a:cs typeface="Cambria"/>
+              </a:rPr>
+              <a:t>significant home court advantage. Otherwise, Ken Pomeroy’s measurements of offensive and defensive efficiency explain a significant amount of the remaining variation.</a:t>
+            </a:r>
+            <a:endParaRPr lang="en-US" sz="3200" dirty="0" smtClean="0">
+              <a:latin typeface="Cambria"/>
+              <a:cs typeface="Cambria"/>
+            </a:endParaRPr>
+          </a:p>
+        </p:txBody>
+      </p:sp>
+      <p:sp>
+        <p:nvSpPr>
+          <p:cNvPr id="111" name="Rectangle 110"/>
+          <p:cNvSpPr>
+            <a:spLocks/>
+          </p:cNvSpPr>
+          <p:nvPr/>
+        </p:nvSpPr>
+        <p:spPr>
+          <a:xfrm>
+            <a:off x="457200" y="26898600"/>
+            <a:ext cx="11887200" cy="838200"/>
+          </a:xfrm>
+          <a:prstGeom prst="rect">
+            <a:avLst/>
+          </a:prstGeom>
+          <a:solidFill>
+            <a:schemeClr val="tx1"/>
+          </a:solidFill>
+          <a:ln>
+            <a:solidFill>
+              <a:schemeClr val="tx1"/>
+            </a:solidFill>
+          </a:ln>
+          <a:effectLst>
+            <a:innerShdw blurRad="63500" dist="50800" dir="13500000">
+              <a:srgbClr val="000000">
+                <a:alpha val="50000"/>
+              </a:srgbClr>
+            </a:innerShdw>
+          </a:effectLst>
+        </p:spPr>
+        <p:style>
+          <a:lnRef idx="1">
+            <a:schemeClr val="accent1"/>
+          </a:lnRef>
+          <a:fillRef idx="3">
+            <a:schemeClr val="accent1"/>
+          </a:fillRef>
+          <a:effectRef idx="2">
+            <a:schemeClr val="accent1"/>
+          </a:effectRef>
+          <a:fontRef idx="minor">
+            <a:schemeClr val="lt1"/>
+          </a:fontRef>
+        </p:style>
+        <p:txBody>
+          <a:bodyPr rtlCol="0" anchor="ctr"/>
+          <a:lstStyle/>
+          <a:p>
+            <a:pPr algn="ctr"/>
+            <a:endParaRPr lang="en-US">
+              <a:latin typeface="Cambria" pitchFamily="18" charset="0"/>
+            </a:endParaRPr>
+          </a:p>
+        </p:txBody>
+      </p:sp>
+      <p:sp>
+        <p:nvSpPr>
+          <p:cNvPr id="112" name="TextBox 111"/>
+          <p:cNvSpPr txBox="1"/>
+          <p:nvPr/>
+        </p:nvSpPr>
+        <p:spPr>
+          <a:xfrm>
+            <a:off x="457200" y="26898600"/>
+            <a:ext cx="11887200" cy="769441"/>
+          </a:xfrm>
+          <a:prstGeom prst="rect">
+            <a:avLst/>
+          </a:prstGeom>
+          <a:noFill/>
+        </p:spPr>
+        <p:txBody>
+          <a:bodyPr wrap="square" rtlCol="0">
+            <a:spAutoFit/>
+          </a:bodyPr>
+          <a:lstStyle/>
+          <a:p>
+            <a:pPr algn="ctr"/>
+            <a:r>
+              <a:rPr lang="en-US" sz="4400" dirty="0" smtClean="0">
+                <a:solidFill>
+                  <a:schemeClr val="bg1"/>
+                </a:solidFill>
+                <a:latin typeface="Helvetica"/>
+                <a:cs typeface="Helvetica"/>
+              </a:rPr>
+              <a:t>Learn More</a:t>
+            </a:r>
+            <a:endParaRPr lang="en-US" sz="4400" dirty="0">
+              <a:solidFill>
+                <a:schemeClr val="bg1"/>
+              </a:solidFill>
+              <a:latin typeface="Helvetica"/>
+              <a:cs typeface="Helvetica"/>
+            </a:endParaRPr>
+          </a:p>
+        </p:txBody>
+      </p:sp>
+      <p:sp>
+        <p:nvSpPr>
+          <p:cNvPr id="114" name="TextBox 113"/>
+          <p:cNvSpPr txBox="1"/>
+          <p:nvPr/>
+        </p:nvSpPr>
+        <p:spPr>
+          <a:xfrm>
+            <a:off x="533400" y="27889200"/>
+            <a:ext cx="11734800" cy="584776"/>
+          </a:xfrm>
+          <a:prstGeom prst="rect">
+            <a:avLst/>
+          </a:prstGeom>
+          <a:noFill/>
+        </p:spPr>
+        <p:txBody>
+          <a:bodyPr wrap="square" rtlCol="0">
+            <a:spAutoFit/>
+          </a:bodyPr>
+          <a:lstStyle/>
+          <a:p>
+            <a:pPr algn="ctr"/>
+            <a:r>
+              <a:rPr lang="en-US" sz="3200" b="1" dirty="0" smtClean="0">
+                <a:latin typeface="Cambria"/>
+                <a:cs typeface="Cambria"/>
+              </a:rPr>
+              <a:t>More to come at: </a:t>
+            </a:r>
+            <a:r>
+              <a:rPr lang="en-US" sz="3200" b="1" u="sng" dirty="0" err="1">
+                <a:latin typeface="Cambria"/>
+                <a:cs typeface="Cambria"/>
+              </a:rPr>
+              <a:t>b</a:t>
+            </a:r>
+            <a:r>
+              <a:rPr lang="en-US" sz="3200" b="1" u="sng" dirty="0" err="1" smtClean="0">
+                <a:latin typeface="Cambria"/>
+                <a:cs typeface="Cambria"/>
+              </a:rPr>
+              <a:t>ayesketball.github.io</a:t>
+            </a:r>
+            <a:endParaRPr lang="en-US" sz="3200" b="1" u="sng" dirty="0" smtClean="0">
               <a:latin typeface="Cambria"/>
               <a:cs typeface="Cambria"/>
             </a:endParaRPr>

</xml_diff>

<commit_message>
Updated poster with Monte Carlo simulations
</commit_message>
<xml_diff>
--- a/poster/poster-master.pptx
+++ b/poster/poster-master.pptx
@@ -139,7 +139,7 @@
   </p:defaultTextStyle>
   <p:extLst>
     <p:ext uri="{EFAFB233-063F-42B5-8137-9DF3F51BA10A}">
-      <p15:sldGuideLst xmlns:p15="http://schemas.microsoft.com/office/powerpoint/2012/main" xmlns="">
+      <p15:sldGuideLst xmlns="" xmlns:p15="http://schemas.microsoft.com/office/powerpoint/2012/main">
         <p15:guide id="1" orient="horz" pos="9216">
           <p15:clr>
             <a:srgbClr val="A4A3A4"/>
@@ -4798,19 +4798,8 @@
                 <a:latin typeface="Cambria"/>
                 <a:cs typeface="Cambria"/>
               </a:rPr>
-              <a:t> to retrieve and extract game data</a:t>
-            </a:r>
-            <a:r>
-              <a:rPr lang="en-US" sz="3200" dirty="0" smtClean="0">
-                <a:latin typeface="Cambria"/>
-                <a:cs typeface="Cambria"/>
-              </a:rPr>
-              <a:t>. Before model fitting, we calculated differences of team features between opponents to quantify their relative (not absolute) attributes.</a:t>
-            </a:r>
-            <a:endParaRPr lang="en-US" sz="3200" dirty="0" smtClean="0">
-              <a:latin typeface="Cambria"/>
-              <a:cs typeface="Cambria"/>
-            </a:endParaRPr>
+              <a:t> to retrieve and extract game data. Before model fitting, we calculated differences of team features between opponents to quantify their relative (not absolute) attributes.</a:t>
+            </a:r>
           </a:p>
         </p:txBody>
       </p:sp>
@@ -4978,7 +4967,7 @@
         <p:spPr>
           <a:xfrm>
             <a:off x="24307800" y="4532799"/>
-            <a:ext cx="11734800" cy="2477601"/>
+            <a:ext cx="11734800" cy="1492716"/>
           </a:xfrm>
           <a:prstGeom prst="rect">
             <a:avLst/>
@@ -5011,22 +5000,40 @@
                 <a:latin typeface="Cambria"/>
                 <a:cs typeface="Cambria"/>
               </a:rPr>
-              <a:t>After training our model and testing it against a held-out testing dataset, we correctly predicted </a:t>
+              <a:t>Accuracy against test dataset: </a:t>
             </a:r>
             <a:r>
               <a:rPr lang="en-US" sz="3200" b="1" dirty="0" smtClean="0">
                 <a:latin typeface="Cambria"/>
                 <a:cs typeface="Cambria"/>
               </a:rPr>
-              <a:t>76%</a:t>
+              <a:t>76</a:t>
+            </a:r>
+            <a:r>
+              <a:rPr lang="en-US" sz="3200" b="1" dirty="0" smtClean="0">
+                <a:latin typeface="Cambria"/>
+                <a:cs typeface="Cambria"/>
+              </a:rPr>
+              <a:t>%</a:t>
             </a:r>
             <a:r>
               <a:rPr lang="en-US" sz="3200" dirty="0" smtClean="0">
                 <a:latin typeface="Cambria"/>
                 <a:cs typeface="Cambria"/>
               </a:rPr>
-              <a:t> of regular season games. Our coding process would result in 50% accuracy by random chance.</a:t>
-            </a:r>
+              <a:t> </a:t>
+            </a:r>
+            <a:r>
+              <a:rPr lang="en-US" sz="3200" dirty="0" smtClean="0">
+                <a:latin typeface="Cambria"/>
+                <a:cs typeface="Cambria"/>
+              </a:rPr>
+              <a:t>(vs. 50% by random chance).</a:t>
+            </a:r>
+            <a:endParaRPr lang="en-US" sz="3200" dirty="0" smtClean="0">
+              <a:latin typeface="Cambria"/>
+              <a:cs typeface="Cambria"/>
+            </a:endParaRPr>
           </a:p>
         </p:txBody>
       </p:sp>
@@ -5081,7 +5088,21 @@
                 <a:latin typeface="Cambria"/>
                 <a:cs typeface="Cambria"/>
               </a:rPr>
-              <a:t>We simulated their matchups 10,000 times as well: </a:t>
+              <a:t>We simulated their matchups </a:t>
+            </a:r>
+            <a:r>
+              <a:rPr lang="en-US" sz="3200" dirty="0" smtClean="0">
+                <a:latin typeface="Cambria"/>
+                <a:cs typeface="Cambria"/>
+              </a:rPr>
+              <a:t>20,000 </a:t>
+            </a:r>
+            <a:r>
+              <a:rPr lang="en-US" sz="3200" dirty="0" smtClean="0">
+                <a:latin typeface="Cambria"/>
+                <a:cs typeface="Cambria"/>
+              </a:rPr>
+              <a:t>times as well: </a:t>
             </a:r>
           </a:p>
         </p:txBody>
@@ -5191,14 +5212,7 @@
                           <a:latin typeface="Cambria"/>
                           <a:cs typeface="Cambria"/>
                         </a:rPr>
-                        <a:t>33,000 </a:t>
-                      </a:r>
-                      <a:r>
-                        <a:rPr lang="en-US" sz="4400" dirty="0" smtClean="0">
-                          <a:latin typeface="Cambria"/>
-                          <a:cs typeface="Cambria"/>
-                        </a:rPr>
-                        <a:t>(2010-2015)</a:t>
+                        <a:t>33,000 (2010-2015)</a:t>
                       </a:r>
                       <a:endParaRPr lang="en-US" sz="4400" dirty="0">
                         <a:latin typeface="Cambria"/>
@@ -5259,21 +5273,7 @@
                 <a:latin typeface="Cambria"/>
                 <a:cs typeface="Cambria"/>
               </a:rPr>
-              <a:t>Ken Pomeroy produces basketball statistics adjusted for team possessions and game tempo. We used several of his statistics </a:t>
-            </a:r>
-            <a:r>
-              <a:rPr lang="en-US" sz="3200" dirty="0" smtClean="0">
-                <a:latin typeface="Cambria"/>
-                <a:cs typeface="Cambria"/>
-              </a:rPr>
-              <a:t>and ideas as </a:t>
-            </a:r>
-            <a:r>
-              <a:rPr lang="en-US" sz="3200" dirty="0" smtClean="0">
-                <a:latin typeface="Cambria"/>
-                <a:cs typeface="Cambria"/>
-              </a:rPr>
-              <a:t>features in our own models:</a:t>
+              <a:t>Ken Pomeroy produces basketball statistics adjusted for team possessions and game tempo. We used several of his statistics and ideas as features in our own models:</a:t>
             </a:r>
           </a:p>
         </p:txBody>
@@ -5791,7 +5791,7 @@
           <p:nvPr>
             <p:extLst>
               <p:ext uri="{D42A27DB-BD31-4B8C-83A1-F6EECF244321}">
-                <p14:modId xmlns:p14="http://schemas.microsoft.com/office/powerpoint/2010/main" val="1881362785"/>
+                <p14:modId xmlns:p14="http://schemas.microsoft.com/office/powerpoint/2010/main" val="34924481"/>
               </p:ext>
             </p:extLst>
           </p:nvPr>
@@ -5822,7 +5822,7 @@
                           <a:latin typeface="Helvetica"/>
                           <a:cs typeface="Helvetica"/>
                         </a:rPr>
-                        <a:t>72%</a:t>
+                        <a:t>59%</a:t>
                       </a:r>
                       <a:endParaRPr lang="en-US" sz="4000" b="0" u="none" dirty="0">
                         <a:latin typeface="Helvetica"/>
@@ -5859,8 +5859,12 @@
                           <a:latin typeface="Helvetica"/>
                           <a:cs typeface="Helvetica"/>
                         </a:rPr>
-                        <a:t>71%</a:t>
+                        <a:t>45%</a:t>
                       </a:r>
+                      <a:endParaRPr lang="en-US" sz="4000" b="0" u="none" dirty="0" smtClean="0">
+                        <a:latin typeface="Helvetica"/>
+                        <a:cs typeface="Helvetica"/>
+                      </a:endParaRPr>
                     </a:p>
                   </a:txBody>
                   <a:tcPr/>
@@ -6035,7 +6039,7 @@
           <p:nvPr>
             <p:extLst>
               <p:ext uri="{D42A27DB-BD31-4B8C-83A1-F6EECF244321}">
-                <p14:modId xmlns:p14="http://schemas.microsoft.com/office/powerpoint/2010/main" val="2239197317"/>
+                <p14:modId xmlns:p14="http://schemas.microsoft.com/office/powerpoint/2010/main" val="937814259"/>
               </p:ext>
             </p:extLst>
           </p:nvPr>
@@ -6066,7 +6070,7 @@
                           <a:latin typeface="Helvetica"/>
                           <a:cs typeface="Helvetica"/>
                         </a:rPr>
-                        <a:t>28%</a:t>
+                        <a:t>41%</a:t>
                       </a:r>
                       <a:endParaRPr lang="en-US" sz="4000" b="0" u="none" dirty="0">
                         <a:latin typeface="Helvetica"/>
@@ -6103,8 +6107,12 @@
                           <a:latin typeface="Helvetica"/>
                           <a:cs typeface="Helvetica"/>
                         </a:rPr>
-                        <a:t>27%</a:t>
+                        <a:t>29%</a:t>
                       </a:r>
+                      <a:endParaRPr lang="en-US" sz="4000" b="0" u="none" dirty="0" smtClean="0">
+                        <a:latin typeface="Helvetica"/>
+                        <a:cs typeface="Helvetica"/>
+                      </a:endParaRPr>
                     </a:p>
                   </a:txBody>
                   <a:tcPr/>
@@ -6123,7 +6131,7 @@
           <p:nvPr>
             <p:extLst>
               <p:ext uri="{D42A27DB-BD31-4B8C-83A1-F6EECF244321}">
-                <p14:modId xmlns:p14="http://schemas.microsoft.com/office/powerpoint/2010/main" val="3183746653"/>
+                <p14:modId xmlns:p14="http://schemas.microsoft.com/office/powerpoint/2010/main" val="4286341582"/>
               </p:ext>
             </p:extLst>
           </p:nvPr>
@@ -6154,7 +6162,7 @@
                           <a:latin typeface="Helvetica"/>
                           <a:cs typeface="Helvetica"/>
                         </a:rPr>
-                        <a:t>100%</a:t>
+                        <a:t>75%</a:t>
                       </a:r>
                       <a:endParaRPr lang="en-US" sz="4000" b="0" u="none" dirty="0">
                         <a:latin typeface="Helvetica"/>
@@ -6191,8 +6199,12 @@
                           <a:latin typeface="Helvetica"/>
                           <a:cs typeface="Helvetica"/>
                         </a:rPr>
-                        <a:t>2.3%</a:t>
+                        <a:t>23%</a:t>
                       </a:r>
+                      <a:endParaRPr lang="en-US" sz="4000" b="0" u="none" dirty="0" smtClean="0">
+                        <a:latin typeface="Helvetica"/>
+                        <a:cs typeface="Helvetica"/>
+                      </a:endParaRPr>
                     </a:p>
                   </a:txBody>
                   <a:tcPr/>
@@ -6211,7 +6223,7 @@
           <p:nvPr>
             <p:extLst>
               <p:ext uri="{D42A27DB-BD31-4B8C-83A1-F6EECF244321}">
-                <p14:modId xmlns:p14="http://schemas.microsoft.com/office/powerpoint/2010/main" val="2348773869"/>
+                <p14:modId xmlns:p14="http://schemas.microsoft.com/office/powerpoint/2010/main" val="683869802"/>
               </p:ext>
             </p:extLst>
           </p:nvPr>
@@ -6242,7 +6254,7 @@
                           <a:latin typeface="Helvetica"/>
                           <a:cs typeface="Helvetica"/>
                         </a:rPr>
-                        <a:t>0%</a:t>
+                        <a:t>25%</a:t>
                       </a:r>
                       <a:endParaRPr lang="en-US" sz="4000" b="0" u="none" dirty="0">
                         <a:latin typeface="Helvetica"/>
@@ -6279,8 +6291,12 @@
                           <a:latin typeface="Helvetica"/>
                           <a:cs typeface="Helvetica"/>
                         </a:rPr>
-                        <a:t>0%</a:t>
+                        <a:t>3.2%</a:t>
                       </a:r>
+                      <a:endParaRPr lang="en-US" sz="4000" b="0" u="none" dirty="0" smtClean="0">
+                        <a:latin typeface="Helvetica"/>
+                        <a:cs typeface="Helvetica"/>
+                      </a:endParaRPr>
                     </a:p>
                   </a:txBody>
                   <a:tcPr/>
@@ -6993,7 +7009,7 @@
         </p:nvSpPr>
         <p:spPr>
           <a:xfrm>
-            <a:off x="24307800" y="10672842"/>
+            <a:off x="24307800" y="9448800"/>
             <a:ext cx="11734800" cy="1985159"/>
           </a:xfrm>
           <a:prstGeom prst="rect">
@@ -7014,10 +7030,6 @@
               </a:rPr>
               <a:t>2015 NCAA Tournament</a:t>
             </a:r>
-            <a:endParaRPr lang="en-US" sz="4400" b="1" u="sng" dirty="0" smtClean="0">
-              <a:latin typeface="Cambria"/>
-              <a:cs typeface="Cambria"/>
-            </a:endParaRPr>
           </a:p>
           <a:p>
             <a:endParaRPr lang="en-US" sz="1500" dirty="0">
@@ -7031,7 +7043,21 @@
                 <a:latin typeface="Cambria"/>
                 <a:cs typeface="Cambria"/>
               </a:rPr>
-              <a:t>We used our model to simulate the entire 2015 NCAA Tournament 10,000 times. The most likely winners:</a:t>
+              <a:t>We used our model to simulate the entire 2015 NCAA Tournament </a:t>
+            </a:r>
+            <a:r>
+              <a:rPr lang="en-US" sz="3200" dirty="0" smtClean="0">
+                <a:latin typeface="Cambria"/>
+                <a:cs typeface="Cambria"/>
+              </a:rPr>
+              <a:t>20,000 </a:t>
+            </a:r>
+            <a:r>
+              <a:rPr lang="en-US" sz="3200" dirty="0" smtClean="0">
+                <a:latin typeface="Cambria"/>
+                <a:cs typeface="Cambria"/>
+              </a:rPr>
+              <a:t>times. The most likely winners:</a:t>
             </a:r>
           </a:p>
         </p:txBody>
@@ -7044,7 +7070,7 @@
         </p:nvSpPr>
         <p:spPr>
           <a:xfrm>
-            <a:off x="24307800" y="20731242"/>
+            <a:off x="24307800" y="20523200"/>
             <a:ext cx="11734800" cy="584776"/>
           </a:xfrm>
           <a:prstGeom prst="rect">
@@ -7064,7 +7090,35 @@
                 <a:latin typeface="Cambria"/>
                 <a:cs typeface="Cambria"/>
               </a:rPr>
-              <a:t>Most common championship outcome:           over         (24%)</a:t>
+              <a:t>Most common </a:t>
+            </a:r>
+            <a:r>
+              <a:rPr lang="en-US" sz="3200" dirty="0" smtClean="0">
+                <a:latin typeface="Cambria"/>
+                <a:cs typeface="Cambria"/>
+              </a:rPr>
+              <a:t>championship:           </a:t>
+            </a:r>
+            <a:r>
+              <a:rPr lang="en-US" sz="3200" dirty="0" smtClean="0">
+                <a:latin typeface="Cambria"/>
+                <a:cs typeface="Cambria"/>
+              </a:rPr>
+              <a:t>over         </a:t>
+            </a:r>
+            <a:r>
+              <a:rPr lang="en-US" sz="3200" dirty="0" smtClean="0">
+                <a:latin typeface="Cambria"/>
+                <a:cs typeface="Cambria"/>
+              </a:rPr>
+              <a:t>(9.6%</a:t>
+            </a:r>
+            <a:r>
+              <a:rPr lang="en-US" sz="3200" dirty="0" smtClean="0">
+                <a:latin typeface="Cambria"/>
+                <a:cs typeface="Cambria"/>
+              </a:rPr>
+              <a:t>)</a:t>
             </a:r>
           </a:p>
         </p:txBody>
@@ -7091,7 +7145,7 @@
         </p:blipFill>
         <p:spPr>
           <a:xfrm>
-            <a:off x="25134841" y="16714966"/>
+            <a:off x="25134841" y="15490924"/>
             <a:ext cx="989610" cy="914400"/>
           </a:xfrm>
           <a:prstGeom prst="rect">
@@ -7121,7 +7175,7 @@
         </p:blipFill>
         <p:spPr>
           <a:xfrm>
-            <a:off x="25247599" y="19727940"/>
+            <a:off x="25247599" y="19519898"/>
             <a:ext cx="774676" cy="914400"/>
           </a:xfrm>
           <a:prstGeom prst="rect">
@@ -7151,7 +7205,7 @@
         </p:blipFill>
         <p:spPr>
           <a:xfrm>
-            <a:off x="31775400" y="20819845"/>
+            <a:off x="30962600" y="20611803"/>
             <a:ext cx="744376" cy="516155"/>
           </a:xfrm>
           <a:prstGeom prst="rect">
@@ -7181,7 +7235,7 @@
         </p:blipFill>
         <p:spPr>
           <a:xfrm>
-            <a:off x="25115605" y="15648166"/>
+            <a:off x="25115605" y="14424124"/>
             <a:ext cx="1028082" cy="914400"/>
           </a:xfrm>
           <a:prstGeom prst="rect">
@@ -7211,7 +7265,7 @@
         </p:blipFill>
         <p:spPr>
           <a:xfrm>
-            <a:off x="33557274" y="20819845"/>
+            <a:off x="32744474" y="20611803"/>
             <a:ext cx="580326" cy="516155"/>
           </a:xfrm>
           <a:prstGeom prst="rect">
@@ -7241,7 +7295,7 @@
         </p:blipFill>
         <p:spPr>
           <a:xfrm>
-            <a:off x="25100257" y="14505166"/>
+            <a:off x="25100257" y="13281124"/>
             <a:ext cx="1058779" cy="1005840"/>
           </a:xfrm>
           <a:prstGeom prst="rect">
@@ -7271,7 +7325,7 @@
         </p:blipFill>
         <p:spPr>
           <a:xfrm>
-            <a:off x="24970293" y="13438366"/>
+            <a:off x="24970293" y="12214324"/>
             <a:ext cx="1318707" cy="914400"/>
           </a:xfrm>
           <a:prstGeom prst="rect">
@@ -7288,13 +7342,13 @@
           <p:nvPr>
             <p:extLst>
               <p:ext uri="{D42A27DB-BD31-4B8C-83A1-F6EECF244321}">
-                <p14:modId xmlns:p14="http://schemas.microsoft.com/office/powerpoint/2010/main" val="2842001159"/>
+                <p14:modId xmlns:p14="http://schemas.microsoft.com/office/powerpoint/2010/main" val="1126947484"/>
               </p:ext>
             </p:extLst>
           </p:nvPr>
         </p:nvGraphicFramePr>
         <p:xfrm>
-          <a:off x="26670000" y="12826134"/>
+          <a:off x="26670000" y="11602092"/>
           <a:ext cx="8763000" cy="579120"/>
         </p:xfrm>
         <a:graphic>
@@ -7364,13 +7418,13 @@
           <p:nvPr>
             <p:extLst>
               <p:ext uri="{D42A27DB-BD31-4B8C-83A1-F6EECF244321}">
-                <p14:modId xmlns:p14="http://schemas.microsoft.com/office/powerpoint/2010/main" val="1203284766"/>
+                <p14:modId xmlns:p14="http://schemas.microsoft.com/office/powerpoint/2010/main" val="3851412013"/>
               </p:ext>
             </p:extLst>
           </p:nvPr>
         </p:nvGraphicFramePr>
         <p:xfrm>
-          <a:off x="26670000" y="13541860"/>
+          <a:off x="26670000" y="12317818"/>
           <a:ext cx="8763000" cy="701040"/>
         </p:xfrm>
         <a:graphic>
@@ -7395,7 +7449,7 @@
                           <a:latin typeface="Helvetica"/>
                           <a:cs typeface="Helvetica"/>
                         </a:rPr>
-                        <a:t>99%</a:t>
+                        <a:t>74%</a:t>
                       </a:r>
                       <a:endParaRPr lang="en-US" sz="4000" b="0" u="none" dirty="0">
                         <a:latin typeface="Helvetica"/>
@@ -7432,8 +7486,12 @@
                           <a:latin typeface="Helvetica"/>
                           <a:cs typeface="Helvetica"/>
                         </a:rPr>
-                        <a:t>77%</a:t>
+                        <a:t>35%</a:t>
                       </a:r>
+                      <a:endParaRPr lang="en-US" sz="4000" b="0" u="none" dirty="0" smtClean="0">
+                        <a:latin typeface="Helvetica"/>
+                        <a:cs typeface="Helvetica"/>
+                      </a:endParaRPr>
                     </a:p>
                   </a:txBody>
                   <a:tcPr/>
@@ -7451,7 +7509,7 @@
         </p:nvSpPr>
         <p:spPr>
           <a:xfrm>
-            <a:off x="24307800" y="13710900"/>
+            <a:off x="24307800" y="12486858"/>
             <a:ext cx="609599" cy="369332"/>
           </a:xfrm>
           <a:prstGeom prst="rect">
@@ -7490,7 +7548,7 @@
         </p:nvSpPr>
         <p:spPr>
           <a:xfrm>
-            <a:off x="24307800" y="14825206"/>
+            <a:off x="24307800" y="13601164"/>
             <a:ext cx="609599" cy="369332"/>
           </a:xfrm>
           <a:prstGeom prst="rect">
@@ -7529,7 +7587,7 @@
         </p:nvSpPr>
         <p:spPr>
           <a:xfrm>
-            <a:off x="24307800" y="15917942"/>
+            <a:off x="24307800" y="14693900"/>
             <a:ext cx="609599" cy="369332"/>
           </a:xfrm>
           <a:prstGeom prst="rect">
@@ -7568,7 +7626,7 @@
         </p:nvSpPr>
         <p:spPr>
           <a:xfrm>
-            <a:off x="24307800" y="16982420"/>
+            <a:off x="24307800" y="15758378"/>
             <a:ext cx="609599" cy="369332"/>
           </a:xfrm>
           <a:prstGeom prst="rect">
@@ -7608,13 +7666,13 @@
           <p:nvPr>
             <p:extLst>
               <p:ext uri="{D42A27DB-BD31-4B8C-83A1-F6EECF244321}">
-                <p14:modId xmlns:p14="http://schemas.microsoft.com/office/powerpoint/2010/main" val="876822068"/>
+                <p14:modId xmlns:p14="http://schemas.microsoft.com/office/powerpoint/2010/main" val="1905891079"/>
               </p:ext>
             </p:extLst>
           </p:nvPr>
         </p:nvGraphicFramePr>
         <p:xfrm>
-          <a:off x="26670000" y="14593420"/>
+          <a:off x="26670000" y="13369378"/>
           <a:ext cx="8763000" cy="701040"/>
         </p:xfrm>
         <a:graphic>
@@ -7639,7 +7697,7 @@
                           <a:latin typeface="Helvetica"/>
                           <a:cs typeface="Helvetica"/>
                         </a:rPr>
-                        <a:t>52%</a:t>
+                        <a:t>49%</a:t>
                       </a:r>
                       <a:endParaRPr lang="en-US" sz="4000" b="0" u="none" dirty="0">
                         <a:latin typeface="Helvetica"/>
@@ -7676,8 +7734,12 @@
                           <a:latin typeface="Helvetica"/>
                           <a:cs typeface="Helvetica"/>
                         </a:rPr>
-                        <a:t>12%</a:t>
+                        <a:t>16%</a:t>
                       </a:r>
+                      <a:endParaRPr lang="en-US" sz="4000" b="0" u="none" dirty="0" smtClean="0">
+                        <a:latin typeface="Helvetica"/>
+                        <a:cs typeface="Helvetica"/>
+                      </a:endParaRPr>
                     </a:p>
                   </a:txBody>
                   <a:tcPr/>
@@ -7696,13 +7758,13 @@
           <p:nvPr>
             <p:extLst>
               <p:ext uri="{D42A27DB-BD31-4B8C-83A1-F6EECF244321}">
-                <p14:modId xmlns:p14="http://schemas.microsoft.com/office/powerpoint/2010/main" val="2895403599"/>
+                <p14:modId xmlns:p14="http://schemas.microsoft.com/office/powerpoint/2010/main" val="2655655015"/>
               </p:ext>
             </p:extLst>
           </p:nvPr>
         </p:nvGraphicFramePr>
         <p:xfrm>
-          <a:off x="26670000" y="15700860"/>
+          <a:off x="26670000" y="14476818"/>
           <a:ext cx="8763000" cy="701040"/>
         </p:xfrm>
         <a:graphic>
@@ -7727,7 +7789,7 @@
                           <a:latin typeface="Helvetica"/>
                           <a:cs typeface="Helvetica"/>
                         </a:rPr>
-                        <a:t>56%</a:t>
+                        <a:t>47%</a:t>
                       </a:r>
                       <a:endParaRPr lang="en-US" sz="4000" b="0" u="none" dirty="0">
                         <a:latin typeface="Helvetica"/>
@@ -7764,8 +7826,12 @@
                           <a:latin typeface="Helvetica"/>
                           <a:cs typeface="Helvetica"/>
                         </a:rPr>
-                        <a:t>4.8%</a:t>
+                        <a:t>13%</a:t>
                       </a:r>
+                      <a:endParaRPr lang="en-US" sz="4000" b="0" u="none" dirty="0" smtClean="0">
+                        <a:latin typeface="Helvetica"/>
+                        <a:cs typeface="Helvetica"/>
+                      </a:endParaRPr>
                     </a:p>
                   </a:txBody>
                   <a:tcPr/>
@@ -7784,13 +7850,13 @@
           <p:nvPr>
             <p:extLst>
               <p:ext uri="{D42A27DB-BD31-4B8C-83A1-F6EECF244321}">
-                <p14:modId xmlns:p14="http://schemas.microsoft.com/office/powerpoint/2010/main" val="364762423"/>
+                <p14:modId xmlns:p14="http://schemas.microsoft.com/office/powerpoint/2010/main" val="2842775364"/>
               </p:ext>
             </p:extLst>
           </p:nvPr>
         </p:nvGraphicFramePr>
         <p:xfrm>
-          <a:off x="26670000" y="16756231"/>
+          <a:off x="26670000" y="15532189"/>
           <a:ext cx="8763000" cy="701040"/>
         </p:xfrm>
         <a:graphic>
@@ -7815,7 +7881,7 @@
                           <a:latin typeface="Helvetica"/>
                           <a:cs typeface="Helvetica"/>
                         </a:rPr>
-                        <a:t>48%</a:t>
+                        <a:t>37%</a:t>
                       </a:r>
                       <a:endParaRPr lang="en-US" sz="4000" b="0" u="none" dirty="0">
                         <a:latin typeface="Helvetica"/>
@@ -7852,8 +7918,12 @@
                           <a:latin typeface="Helvetica"/>
                           <a:cs typeface="Helvetica"/>
                         </a:rPr>
-                        <a:t>2.5%</a:t>
+                        <a:t>10%</a:t>
                       </a:r>
+                      <a:endParaRPr lang="en-US" sz="4000" b="0" u="none" dirty="0" smtClean="0">
+                        <a:latin typeface="Helvetica"/>
+                        <a:cs typeface="Helvetica"/>
+                      </a:endParaRPr>
                     </a:p>
                   </a:txBody>
                   <a:tcPr/>
@@ -7863,36 +7933,6 @@
           </a:graphicData>
         </a:graphic>
       </p:graphicFrame>
-      <p:pic>
-        <p:nvPicPr>
-          <p:cNvPr id="98" name="Picture 97" descr="Virginia.pdf"/>
-          <p:cNvPicPr>
-            <a:picLocks noChangeAspect="1"/>
-          </p:cNvPicPr>
-          <p:nvPr/>
-        </p:nvPicPr>
-        <p:blipFill>
-          <a:blip r:embed="rId19">
-            <a:extLst>
-              <a:ext uri="{28A0092B-C50C-407E-A947-70E740481C1C}">
-                <a14:useLocalDpi xmlns:a14="http://schemas.microsoft.com/office/drawing/2010/main" val="0"/>
-              </a:ext>
-            </a:extLst>
-          </a:blip>
-          <a:stretch>
-            <a:fillRect/>
-          </a:stretch>
-        </p:blipFill>
-        <p:spPr>
-          <a:xfrm>
-            <a:off x="24961850" y="17759442"/>
-            <a:ext cx="1339597" cy="914400"/>
-          </a:xfrm>
-          <a:prstGeom prst="rect">
-            <a:avLst/>
-          </a:prstGeom>
-        </p:spPr>
-      </p:pic>
       <p:sp>
         <p:nvSpPr>
           <p:cNvPr id="99" name="TextBox 98"/>
@@ -7901,7 +7941,7 @@
         </p:nvSpPr>
         <p:spPr>
           <a:xfrm>
-            <a:off x="24307800" y="18032492"/>
+            <a:off x="24307800" y="16808450"/>
             <a:ext cx="609599" cy="369332"/>
           </a:xfrm>
           <a:prstGeom prst="rect">
@@ -7922,7 +7962,7 @@
                   <a:schemeClr val="bg2"/>
                 </a:solidFill>
               </a:rPr>
-              <a:t>(2)</a:t>
+              <a:t>(1)</a:t>
             </a:r>
             <a:endParaRPr lang="en-US" sz="1800" dirty="0">
               <a:solidFill>
@@ -7941,13 +7981,13 @@
           <p:nvPr>
             <p:extLst>
               <p:ext uri="{D42A27DB-BD31-4B8C-83A1-F6EECF244321}">
-                <p14:modId xmlns:p14="http://schemas.microsoft.com/office/powerpoint/2010/main" val="3484687974"/>
+                <p14:modId xmlns:p14="http://schemas.microsoft.com/office/powerpoint/2010/main" val="752090776"/>
               </p:ext>
             </p:extLst>
           </p:nvPr>
         </p:nvGraphicFramePr>
         <p:xfrm>
-          <a:off x="26670000" y="17817216"/>
+          <a:off x="26670000" y="16593174"/>
           <a:ext cx="8763000" cy="701040"/>
         </p:xfrm>
         <a:graphic>
@@ -7972,7 +8012,7 @@
                           <a:latin typeface="Helvetica"/>
                           <a:cs typeface="Helvetica"/>
                         </a:rPr>
-                        <a:t>44%</a:t>
+                        <a:t>36%</a:t>
                       </a:r>
                       <a:endParaRPr lang="en-US" sz="4000" b="0" u="none" dirty="0">
                         <a:latin typeface="Helvetica"/>
@@ -8009,8 +8049,12 @@
                           <a:latin typeface="Helvetica"/>
                           <a:cs typeface="Helvetica"/>
                         </a:rPr>
-                        <a:t>1.3%</a:t>
+                        <a:t>6.5%</a:t>
                       </a:r>
+                      <a:endParaRPr lang="en-US" sz="4000" b="0" u="none" dirty="0" smtClean="0">
+                        <a:latin typeface="Helvetica"/>
+                        <a:cs typeface="Helvetica"/>
+                      </a:endParaRPr>
                     </a:p>
                   </a:txBody>
                   <a:tcPr/>
@@ -8028,7 +8072,7 @@
         </p:nvSpPr>
         <p:spPr>
           <a:xfrm>
-            <a:off x="24307800" y="18927266"/>
+            <a:off x="24307800" y="18719224"/>
             <a:ext cx="11734800" cy="584776"/>
           </a:xfrm>
           <a:prstGeom prst="rect">
@@ -8060,7 +8104,7 @@
         </p:nvSpPr>
         <p:spPr>
           <a:xfrm>
-            <a:off x="24307800" y="19993608"/>
+            <a:off x="24307800" y="19785566"/>
             <a:ext cx="609599" cy="369332"/>
           </a:xfrm>
           <a:prstGeom prst="rect">
@@ -8100,13 +8144,13 @@
           <p:nvPr>
             <p:extLst>
               <p:ext uri="{D42A27DB-BD31-4B8C-83A1-F6EECF244321}">
-                <p14:modId xmlns:p14="http://schemas.microsoft.com/office/powerpoint/2010/main" val="2926232118"/>
+                <p14:modId xmlns:p14="http://schemas.microsoft.com/office/powerpoint/2010/main" val="3205607682"/>
               </p:ext>
             </p:extLst>
           </p:nvPr>
         </p:nvGraphicFramePr>
         <p:xfrm>
-          <a:off x="26670000" y="19827000"/>
+          <a:off x="26670000" y="19618958"/>
           <a:ext cx="8763000" cy="701040"/>
         </p:xfrm>
         <a:graphic>
@@ -8131,7 +8175,7 @@
                           <a:latin typeface="Helvetica"/>
                           <a:cs typeface="Helvetica"/>
                         </a:rPr>
-                        <a:t>0%</a:t>
+                        <a:t>0.02%</a:t>
                       </a:r>
                       <a:endParaRPr lang="en-US" sz="4000" b="0" u="none" dirty="0">
                         <a:latin typeface="Helvetica"/>
@@ -8287,7 +8331,7 @@
             <p:nvPr/>
           </p:nvPicPr>
           <p:blipFill>
-            <a:blip r:embed="rId20">
+            <a:blip r:embed="rId19">
               <a:extLst>
                 <a:ext uri="{28A0092B-C50C-407E-A947-70E740481C1C}">
                   <a14:useLocalDpi xmlns:a14="http://schemas.microsoft.com/office/drawing/2010/main" val="0"/>
@@ -8317,7 +8361,7 @@
             <p:nvPr/>
           </p:nvPicPr>
           <p:blipFill>
-            <a:blip r:embed="rId21">
+            <a:blip r:embed="rId20">
               <a:extLst>
                 <a:ext uri="{28A0092B-C50C-407E-A947-70E740481C1C}">
                   <a14:useLocalDpi xmlns:a14="http://schemas.microsoft.com/office/drawing/2010/main" val="0"/>
@@ -8425,8 +8469,8 @@
         </p:nvSpPr>
         <p:spPr>
           <a:xfrm>
-            <a:off x="24307800" y="7391400"/>
-            <a:ext cx="11734800" cy="2970044"/>
+            <a:off x="24307800" y="6553200"/>
+            <a:ext cx="11734800" cy="2477601"/>
           </a:xfrm>
           <a:prstGeom prst="rect">
             <a:avLst/>
@@ -8459,26 +8503,50 @@
                 <a:latin typeface="Cambria"/>
                 <a:cs typeface="Cambria"/>
               </a:rPr>
-              <a:t>Our model suggests </a:t>
+              <a:t>Our model suggests the existence of a significant home court advantage. Otherwise, </a:t>
             </a:r>
             <a:r>
               <a:rPr lang="en-US" sz="3200" dirty="0" smtClean="0">
                 <a:latin typeface="Cambria"/>
                 <a:cs typeface="Cambria"/>
               </a:rPr>
-              <a:t>the existence of a </a:t>
+              <a:t>offensive </a:t>
             </a:r>
             <a:r>
               <a:rPr lang="en-US" sz="3200" dirty="0" smtClean="0">
                 <a:latin typeface="Cambria"/>
                 <a:cs typeface="Cambria"/>
               </a:rPr>
-              <a:t>significant home court advantage. Otherwise, Ken Pomeroy’s measurements of offensive and defensive efficiency explain a significant amount of the remaining variation.</a:t>
-            </a:r>
-            <a:endParaRPr lang="en-US" sz="3200" dirty="0" smtClean="0">
-              <a:latin typeface="Cambria"/>
-              <a:cs typeface="Cambria"/>
-            </a:endParaRPr>
+              <a:t>and defensive efficiency explain a significant </a:t>
+            </a:r>
+            <a:r>
+              <a:rPr lang="en-US" sz="3200" dirty="0" smtClean="0">
+                <a:latin typeface="Cambria"/>
+                <a:cs typeface="Cambria"/>
+              </a:rPr>
+              <a:t>amount </a:t>
+            </a:r>
+            <a:r>
+              <a:rPr lang="en-US" sz="3200" dirty="0" smtClean="0">
+                <a:latin typeface="Cambria"/>
+                <a:cs typeface="Cambria"/>
+              </a:rPr>
+              <a:t>of </a:t>
+            </a:r>
+            <a:r>
+              <a:rPr lang="en-US" sz="3200" dirty="0" smtClean="0">
+                <a:latin typeface="Cambria"/>
+                <a:cs typeface="Cambria"/>
+              </a:rPr>
+              <a:t>remaining </a:t>
+            </a:r>
+            <a:r>
+              <a:rPr lang="en-US" sz="3200" dirty="0" smtClean="0">
+                <a:latin typeface="Cambria"/>
+                <a:cs typeface="Cambria"/>
+              </a:rPr>
+              <a:t>variation.</a:t>
+            </a:r>
           </a:p>
         </p:txBody>
       </p:sp>
@@ -8633,6 +8701,197 @@
           </a:p>
         </p:txBody>
       </p:sp>
+      <p:pic>
+        <p:nvPicPr>
+          <p:cNvPr id="115" name="Picture 114" descr="Duke.pdf"/>
+          <p:cNvPicPr>
+            <a:picLocks noChangeAspect="1"/>
+          </p:cNvPicPr>
+          <p:nvPr/>
+        </p:nvPicPr>
+        <p:blipFill>
+          <a:blip r:embed="rId9">
+            <a:extLst>
+              <a:ext uri="{28A0092B-C50C-407E-A947-70E740481C1C}">
+                <a14:useLocalDpi xmlns:a14="http://schemas.microsoft.com/office/drawing/2010/main" val="0"/>
+              </a:ext>
+            </a:extLst>
+          </a:blip>
+          <a:stretch>
+            <a:fillRect/>
+          </a:stretch>
+        </p:blipFill>
+        <p:spPr>
+          <a:xfrm>
+            <a:off x="25091764" y="16530558"/>
+            <a:ext cx="1075765" cy="914400"/>
+          </a:xfrm>
+          <a:prstGeom prst="rect">
+            <a:avLst/>
+          </a:prstGeom>
+        </p:spPr>
+      </p:pic>
+      <p:pic>
+        <p:nvPicPr>
+          <p:cNvPr id="3" name="Picture 2" descr="Virginia.pdf"/>
+          <p:cNvPicPr>
+            <a:picLocks noChangeAspect="1"/>
+          </p:cNvPicPr>
+          <p:nvPr/>
+        </p:nvPicPr>
+        <p:blipFill>
+          <a:blip r:embed="rId21">
+            <a:extLst>
+              <a:ext uri="{28A0092B-C50C-407E-A947-70E740481C1C}">
+                <a14:useLocalDpi xmlns:a14="http://schemas.microsoft.com/office/drawing/2010/main" val="0"/>
+              </a:ext>
+            </a:extLst>
+          </a:blip>
+          <a:stretch>
+            <a:fillRect/>
+          </a:stretch>
+        </p:blipFill>
+        <p:spPr>
+          <a:xfrm>
+            <a:off x="24942800" y="17571958"/>
+            <a:ext cx="1339596" cy="914400"/>
+          </a:xfrm>
+          <a:prstGeom prst="rect">
+            <a:avLst/>
+          </a:prstGeom>
+        </p:spPr>
+      </p:pic>
+      <p:sp>
+        <p:nvSpPr>
+          <p:cNvPr id="116" name="TextBox 115"/>
+          <p:cNvSpPr txBox="1"/>
+          <p:nvPr/>
+        </p:nvSpPr>
+        <p:spPr>
+          <a:xfrm>
+            <a:off x="24307800" y="17800558"/>
+            <a:ext cx="609599" cy="369332"/>
+          </a:xfrm>
+          <a:prstGeom prst="rect">
+            <a:avLst/>
+          </a:prstGeom>
+          <a:noFill/>
+        </p:spPr>
+        <p:txBody>
+          <a:bodyPr wrap="square" rtlCol="0">
+            <a:spAutoFit/>
+          </a:bodyPr>
+          <a:lstStyle/>
+          <a:p>
+            <a:pPr algn="r"/>
+            <a:r>
+              <a:rPr lang="en-US" sz="1800" dirty="0" smtClean="0">
+                <a:solidFill>
+                  <a:schemeClr val="bg2"/>
+                </a:solidFill>
+              </a:rPr>
+              <a:t>(2)</a:t>
+            </a:r>
+            <a:endParaRPr lang="en-US" sz="1800" dirty="0">
+              <a:solidFill>
+                <a:schemeClr val="bg2"/>
+              </a:solidFill>
+            </a:endParaRPr>
+          </a:p>
+        </p:txBody>
+      </p:sp>
+      <p:graphicFrame>
+        <p:nvGraphicFramePr>
+          <p:cNvPr id="117" name="Table 116"/>
+          <p:cNvGraphicFramePr>
+            <a:graphicFrameLocks noGrp="1"/>
+          </p:cNvGraphicFramePr>
+          <p:nvPr>
+            <p:extLst>
+              <p:ext uri="{D42A27DB-BD31-4B8C-83A1-F6EECF244321}">
+                <p14:modId xmlns:p14="http://schemas.microsoft.com/office/powerpoint/2010/main" val="2301546776"/>
+              </p:ext>
+            </p:extLst>
+          </p:nvPr>
+        </p:nvGraphicFramePr>
+        <p:xfrm>
+          <a:off x="26670000" y="17673558"/>
+          <a:ext cx="8763000" cy="701040"/>
+        </p:xfrm>
+        <a:graphic>
+          <a:graphicData uri="http://schemas.openxmlformats.org/drawingml/2006/table">
+            <a:tbl>
+              <a:tblPr firstRow="1" bandRow="1">
+                <a:tableStyleId>{2D5ABB26-0587-4C30-8999-92F81FD0307C}</a:tableStyleId>
+              </a:tblPr>
+              <a:tblGrid>
+                <a:gridCol w="4381500"/>
+                <a:gridCol w="4381500"/>
+              </a:tblGrid>
+              <a:tr h="370840">
+                <a:tc>
+                  <a:txBody>
+                    <a:bodyPr/>
+                    <a:lstStyle/>
+                    <a:p>
+                      <a:pPr algn="ctr"/>
+                      <a:r>
+                        <a:rPr lang="en-US" sz="4000" b="0" u="none" dirty="0" smtClean="0">
+                          <a:latin typeface="Helvetica"/>
+                          <a:cs typeface="Helvetica"/>
+                        </a:rPr>
+                        <a:t>29%</a:t>
+                      </a:r>
+                      <a:endParaRPr lang="en-US" sz="4000" b="0" u="none" dirty="0">
+                        <a:latin typeface="Helvetica"/>
+                        <a:cs typeface="Helvetica"/>
+                      </a:endParaRPr>
+                    </a:p>
+                  </a:txBody>
+                  <a:tcPr/>
+                </a:tc>
+                <a:tc>
+                  <a:txBody>
+                    <a:bodyPr/>
+                    <a:lstStyle/>
+                    <a:p>
+                      <a:pPr marL="0" marR="0" indent="0" algn="ctr" defTabSz="914400" rtl="0" eaLnBrk="1" fontAlgn="auto" latinLnBrk="0" hangingPunct="1">
+                        <a:lnSpc>
+                          <a:spcPct val="100000"/>
+                        </a:lnSpc>
+                        <a:spcBef>
+                          <a:spcPts val="0"/>
+                        </a:spcBef>
+                        <a:spcAft>
+                          <a:spcPts val="0"/>
+                        </a:spcAft>
+                        <a:buClrTx/>
+                        <a:buSzTx/>
+                        <a:buFontTx/>
+                        <a:buNone/>
+                        <a:tabLst/>
+                        <a:defRPr/>
+                      </a:pPr>
+                      <a:r>
+                        <a:rPr lang="en-US" sz="4000" b="0" u="none" dirty="0" smtClean="0">
+                          <a:latin typeface="Helvetica"/>
+                          <a:cs typeface="Helvetica"/>
+                        </a:rPr>
+                        <a:t>6.1%</a:t>
+                      </a:r>
+                      <a:endParaRPr lang="en-US" sz="4000" b="0" u="none" dirty="0" smtClean="0">
+                        <a:latin typeface="Helvetica"/>
+                        <a:cs typeface="Helvetica"/>
+                      </a:endParaRPr>
+                    </a:p>
+                  </a:txBody>
+                  <a:tcPr/>
+                </a:tc>
+              </a:tr>
+            </a:tbl>
+          </a:graphicData>
+        </a:graphic>
+      </p:graphicFrame>
     </p:spTree>
   </p:cSld>
   <p:clrMapOvr>

</xml_diff>